<commit_message>
update slides, get consent.
</commit_message>
<xml_diff>
--- a/img/ins/instructions1.4.19.pptx
+++ b/img/ins/instructions1.4.19.pptx
@@ -138,40 +138,6 @@
 </p:cmAuthorLst>
 </file>
 
-<file path=ppt/ink/ink1.xml><?xml version="1.0" encoding="utf-8"?>
-<inkml:ink xmlns:inkml="http://www.w3.org/2003/InkML">
-  <inkml:definitions>
-    <inkml:context xml:id="ctx0">
-      <inkml:inkSource xml:id="inkSrc0">
-        <inkml:traceFormat>
-          <inkml:channel name="X" type="integer" min="-2.14748E9" max="2.14748E9" units="cm"/>
-          <inkml:channel name="Y" type="integer" min="-2.14748E9" max="2.14748E9" units="cm"/>
-          <inkml:channel name="F" type="integer" max="32767" units="dev"/>
-        </inkml:traceFormat>
-        <inkml:channelProperties>
-          <inkml:channelProperty channel="X" name="resolution" value="1000" units="1/cm"/>
-          <inkml:channelProperty channel="Y" name="resolution" value="1000" units="1/cm"/>
-          <inkml:channelProperty channel="F" name="resolution" value="0" units="1/dev"/>
-        </inkml:channelProperties>
-      </inkml:inkSource>
-      <inkml:timestamp xml:id="ts0" timeString="2019-01-03T18:31:13.383"/>
-    </inkml:context>
-    <inkml:brush xml:id="br0">
-      <inkml:brushProperty name="width" value="0.025" units="cm"/>
-      <inkml:brushProperty name="height" value="0.025" units="cm"/>
-      <inkml:brushProperty name="color" value="#FFFFFF"/>
-    </inkml:brush>
-    <inkml:brush xml:id="br1">
-      <inkml:brushProperty name="width" value="0.35" units="cm"/>
-      <inkml:brushProperty name="height" value="0.35" units="cm"/>
-      <inkml:brushProperty name="color" value="#FFFFFF"/>
-    </inkml:brush>
-  </inkml:definitions>
-  <inkml:trace contextRef="#ctx0" brushRef="#br0">3440 1196 24575,'-6'-10'0,"-134"2"0,28 8 0,2 0 0,-6 0 0,-80 0 0,80 0 0,-66 0 0,92 0 0,-50 0 0,32 0 0,14 0 0,18 0 0,14 0 0,10 0 0,2 0 0,22 0 0,0 0 0,12 0 0,28 0 0,40 0 0,54 0 0,-12 0 0,12 0-725,6 0 1,8 0 724,32 0 0,6 0 0,0 0 0,2 0-1114,20 0 0,4 0 1114,0 0 0,2 0 0,10 0 0,2 0 0,0 0 0,-2 0 0,-10 0 0,-2 0 0,0 0 0,-4 0 0,-6 2 0,-10-4 0,-40-4 0,-4 2-341,18 4 1,-4-4 340,36-20 0,-62 24 0,2-2 0,54-22 0,-20 22 0,-40-20 1227,-36 20-1227,-16-8 2301,-24 10-2301,-12 0 830,-14 0-830,-50 0 0,-44 0 0,-50 0 0,38 0 0,-10 0-930,-48 0 1,-8 0 929,26 0 0,-6 0-782,12 0 1,-10 0 0,4 0 781,-32-10 0,0 2 0,36 6 0,-4 2 0,0-2-784,2-4 1,0 0-1,0 2 784,-2 2 0,2 2 0,6 2 0,-12-2 0,6 0-316,-12 0 1,8 0 315,-40 0 0,84 0 0,4 0 1327,-50 0-1327,40 0 2106,52 0-2106,18 0 2824,30-8-2824,14 6 928,54-16-928,56 16 0,-20-4 0,14 0-951,60 6 0,8 0 951,-32 0 0,2 0-856,-2 0 1,12 0 0,-6 0 855,30 0 0,-4 0 0,-36 0 0,2 0 0,-4 0-651,30 0 0,-6 0 651,2 0 0,-6 0 0,-44 0 0,-4 0-208,10 0 0,0 0 208,62 0 1463,-42 0-1463,-60 0 2525,-20 0-2525,-34 0 1618,-8-8-1618,-20 0 580,-58-12-580,-32-2 0,-92-6 0,82 14 0,-4 0-640,-26-4 1,-4 4 639,-2 6 0,4 0 0,24-6 0,0 2-300,-18 10 1,2 0 299,-46-8 0,70 10 0,0 0 0,-62-12 0,38 10 0,42-8 0,20 10 0,32 0 1239,18 0-1239,60 0 639,62 0-639,54 0 0,-46 0 0,4 0-637,0 0 1,4 0 636,20 0 0,-2 0 0,-28 0 0,-2 0-273,6 0 1,-4 0 272,64 0 0,-14 0 0,-10 0 0,-70 0 0,-10 0 0,-48 0 0,-40 0 1237,-42 0-1237,-98-14 0,-38 10-516,62-2 1,-8-2 515,4 2 0,-4-2 0,-8 8 0,-2-4 0,0-10 0,4 0-399,32 12 0,4 0 399,-20-12 0,2 0 0,-46 12 0,62-12 0,-2 2 0,-72 8-296,6-20 296,32 20 0,4-8 0,18 12 0,-2-10 1518,14-4-1518,4-10 851,0-6-851,34-2 337,12 0-337,44 6 0,16 8 0,0 2 0,16-10 0,42 2 0,62-8 0,64 4-797,-64 12 0,4 2 797,12-2 0,-4 0 0,-24 2 0,0 0-361,28-4 0,-2 4 361,42-2 0,-56 2 0,-2 2 0,48 8 0,-24-8 0,-50 12 0,-26 0 0,-18 0 1533,-20 0-1533,0 0 783,-26 0-783,-4 0 0,-6 0 0,0 0 0</inkml:trace>
-  <inkml:trace contextRef="#ctx0" brushRef="#br1" timeOffset="5876">2244 1214 24575,'126'-22'0,"26"6"0,28 16-492,-62 0 0,4 0 0,-10 0 0,4 0 278,24 0 0,2 0 214,-8 0 0,2 0 0,8 0 0,0 0 0,-14 0 0,8 0 0,2 0 0,10 0 0,-14 0 0,-20 0 0,-2 0 0,62 0 0,-14 0 766,-52 0-766,-6 0 395,-24 0-395,-16 0 0,-24 0 0,-4 0 983,-18 0-731,10 0-252,-12 0 0,-76-14 0,-4 10 0,-90-22 0,36 16 0,-12 2-492,0-8 0,-4 0 123,-34 6 1,-6 0-124,-18-4 0,-2-4 0,6 0 0,-4-2 164,44 8 0,-4-2 0,0-2 0,0-2 0,2 0 0,0 0 0,6 4 0,2 2 0,0 0-164,-58-6 0,4 0 94,8 2 1,12-2 566,52 2 1,4 2-170,-18-2 0,4 0 0,-36-10 983,-16-2-271,30 2 271,60 2 0,6 2 0,46 2 0,8 8 0,26-4 0,2 8-495,50-12-488,8 12 0,58-12 0,16 16 0,38-20-777,18 22 777,-72-12 0,2 2 0,0 10 0,2 0 0,8-10 0,2-2-492,10 4 0,0 2 420,-10-8 1,4 0 71,16 2 0,-2-4 0,-12-4 0,-8 0 0,76-8-283,-90 10 1,-6-2 282,34-16 0,26 8 0,-36-16 710,-30 20-710,-18-6 983,-34 20-830,-6-4 470,-18 14-623,-134-6 0,4 8 0,-12 0 0,-8 0-492,20 0 0,0 0 465,-18 0 0,-2 0 27,-2-2 0,-2 4 0,-8 4 0,0 2-492,0 0 0,-2 2 98,-10 6 1,0 0 393,18-6 0,4-2-306,6 8 0,6-4 306,14-12 0,4 2 0,-78 22 0,-18-8 0,36 0 0,6 8 0,50-22 911,2 10-911,38-12 983,6 8-166,32-6-107,96 6-710,54 6 0,-6-6 0,12 2-492,16 4 0,6 4 50,20-2 0,6 2-50,22-2 0,4 2 164,-60 0 0,2 0 0,2 0 72,6 2 1,2-2-1,0 2 256,-2 6 0,0 0 0,2-2 0,2-4 0,-2 0 0,-6-2 0,18 8 0,-6-2-492,20-6 0,-8-2 297,-52-2 1,-6 2-113,12 0 0,2-2 307,-4-4 0,-6-4 0,48 8 983,-6-14-571,-50 0 571,-14 0 0,-20 0 0,-22 0 0,-2 0 0,-22 0-703,-2 0-280,-8 0 0,0 0 0,-2 6 0,-6-46 0,-2 20 0,-8-42 0,0 24 0,0 0 0,16-2 0,-2 2 0,24-10 0,-8 6 0,8-8 0,0 12 0,-6-10 0,4 6 0,-16 2 0,8 4 0,-10 16 0,0-6 0,-2 8 0,-6 0 0,-2 2 0,-44 6 0,0 2 0,-46 8 0,2 0 0,-10 0 0,-2 0 0,0 0 0,2 0 0,10 0 0,4 0 0,24 0 0,4 0 0,10 0 0,8 0 0,4 0 0,8 0 0,2 8 0,-8-6 0,6 4 0,-8-6 0,8 0 0,-8 0 0,6 0 0,-6 0 0,8 0 0,0 0 0,-6 0 0,4 0 0,-4 0 0,8 0 0,-2 0 0,-8 0 0,-4 10 0,-18-8 0,-4 14 0,-24-2 0,10 6 0,-22 2 0,-6 2 0,0-12 0,-12 10 0,14-10 0,2 10 0,10 0 0,6-8 0,-2 4 0,20-14 0,-16 14 0,30-16 0,-6 8 0,8-10 0,2 8 0,10-6 0,-8 8 0,16-10 0,-8 0 0,2 0 0,6 6 0,-6-4 0,8 6 0,0-8 0,0 0 0,-6 0 0,4 0 0,-4 0 0,8 0 0</inkml:trace>
-</inkml:ink>
-</file>
-
 <file path=ppt/slideLayouts/slideLayout1.xml><?xml version="1.0" encoding="utf-8"?>
 <p:sldLayout xmlns:a="http://schemas.openxmlformats.org/drawingml/2006/main" xmlns:r="http://schemas.openxmlformats.org/officeDocument/2006/relationships" xmlns:p="http://schemas.openxmlformats.org/presentationml/2006/main" type="title" preserve="1">
   <p:cSld name="Title Slide">
@@ -303,7 +269,7 @@
           <a:p>
             <a:fld id="{22BE98DE-5B02-5640-B1FB-9B77D9687ABA}" type="datetimeFigureOut">
               <a:rPr lang="en-US" smtClean="0"/>
-              <a:t>1/23/19</a:t>
+              <a:t>4/15/2019</a:t>
             </a:fld>
             <a:endParaRPr lang="en-US"/>
           </a:p>
@@ -473,7 +439,7 @@
           <a:p>
             <a:fld id="{22BE98DE-5B02-5640-B1FB-9B77D9687ABA}" type="datetimeFigureOut">
               <a:rPr lang="en-US" smtClean="0"/>
-              <a:t>1/23/19</a:t>
+              <a:t>4/15/2019</a:t>
             </a:fld>
             <a:endParaRPr lang="en-US"/>
           </a:p>
@@ -653,7 +619,7 @@
           <a:p>
             <a:fld id="{22BE98DE-5B02-5640-B1FB-9B77D9687ABA}" type="datetimeFigureOut">
               <a:rPr lang="en-US" smtClean="0"/>
-              <a:t>1/23/19</a:t>
+              <a:t>4/15/2019</a:t>
             </a:fld>
             <a:endParaRPr lang="en-US"/>
           </a:p>
@@ -823,7 +789,7 @@
           <a:p>
             <a:fld id="{22BE98DE-5B02-5640-B1FB-9B77D9687ABA}" type="datetimeFigureOut">
               <a:rPr lang="en-US" smtClean="0"/>
-              <a:t>1/23/19</a:t>
+              <a:t>4/15/2019</a:t>
             </a:fld>
             <a:endParaRPr lang="en-US"/>
           </a:p>
@@ -1069,7 +1035,7 @@
           <a:p>
             <a:fld id="{22BE98DE-5B02-5640-B1FB-9B77D9687ABA}" type="datetimeFigureOut">
               <a:rPr lang="en-US" smtClean="0"/>
-              <a:t>1/23/19</a:t>
+              <a:t>4/15/2019</a:t>
             </a:fld>
             <a:endParaRPr lang="en-US"/>
           </a:p>
@@ -1301,7 +1267,7 @@
           <a:p>
             <a:fld id="{22BE98DE-5B02-5640-B1FB-9B77D9687ABA}" type="datetimeFigureOut">
               <a:rPr lang="en-US" smtClean="0"/>
-              <a:t>1/23/19</a:t>
+              <a:t>4/15/2019</a:t>
             </a:fld>
             <a:endParaRPr lang="en-US"/>
           </a:p>
@@ -1668,7 +1634,7 @@
           <a:p>
             <a:fld id="{22BE98DE-5B02-5640-B1FB-9B77D9687ABA}" type="datetimeFigureOut">
               <a:rPr lang="en-US" smtClean="0"/>
-              <a:t>1/23/19</a:t>
+              <a:t>4/15/2019</a:t>
             </a:fld>
             <a:endParaRPr lang="en-US"/>
           </a:p>
@@ -1786,7 +1752,7 @@
           <a:p>
             <a:fld id="{22BE98DE-5B02-5640-B1FB-9B77D9687ABA}" type="datetimeFigureOut">
               <a:rPr lang="en-US" smtClean="0"/>
-              <a:t>1/23/19</a:t>
+              <a:t>4/15/2019</a:t>
             </a:fld>
             <a:endParaRPr lang="en-US"/>
           </a:p>
@@ -1881,7 +1847,7 @@
           <a:p>
             <a:fld id="{22BE98DE-5B02-5640-B1FB-9B77D9687ABA}" type="datetimeFigureOut">
               <a:rPr lang="en-US" smtClean="0"/>
-              <a:t>1/23/19</a:t>
+              <a:t>4/15/2019</a:t>
             </a:fld>
             <a:endParaRPr lang="en-US"/>
           </a:p>
@@ -2158,7 +2124,7 @@
           <a:p>
             <a:fld id="{22BE98DE-5B02-5640-B1FB-9B77D9687ABA}" type="datetimeFigureOut">
               <a:rPr lang="en-US" smtClean="0"/>
-              <a:t>1/23/19</a:t>
+              <a:t>4/15/2019</a:t>
             </a:fld>
             <a:endParaRPr lang="en-US"/>
           </a:p>
@@ -2415,7 +2381,7 @@
           <a:p>
             <a:fld id="{22BE98DE-5B02-5640-B1FB-9B77D9687ABA}" type="datetimeFigureOut">
               <a:rPr lang="en-US" smtClean="0"/>
-              <a:t>1/23/19</a:t>
+              <a:t>4/15/2019</a:t>
             </a:fld>
             <a:endParaRPr lang="en-US"/>
           </a:p>
@@ -2628,7 +2594,7 @@
             <a:fld id="{22BE98DE-5B02-5640-B1FB-9B77D9687ABA}" type="datetimeFigureOut">
               <a:rPr lang="en-US" smtClean="0"/>
               <a:pPr/>
-              <a:t>1/23/19</a:t>
+              <a:t>4/15/2019</a:t>
             </a:fld>
             <a:endParaRPr lang="en-US" dirty="0"/>
           </a:p>
@@ -3061,7 +3027,7 @@
         <p:spPr>
           <a:xfrm>
             <a:off x="598353" y="817779"/>
-            <a:ext cx="24041236" cy="12080441"/>
+            <a:ext cx="23156169" cy="12080441"/>
           </a:xfrm>
           <a:prstGeom prst="rect">
             <a:avLst/>
@@ -3069,7 +3035,7 @@
         </p:spPr>
         <p:txBody>
           <a:bodyPr vert="horz" lIns="182856" tIns="91428" rIns="182856" bIns="91428" rtlCol="0">
-            <a:normAutofit fontScale="85000" lnSpcReduction="10000"/>
+            <a:normAutofit/>
           </a:bodyPr>
           <a:lstStyle>
             <a:lvl1pPr marL="0" indent="0" algn="l" defTabSz="914400" rtl="0" eaLnBrk="1" latinLnBrk="0" hangingPunct="1">
@@ -3315,7 +3281,7 @@
           </a:lstStyle>
           <a:p>
             <a:r>
-              <a:rPr lang="en-US" sz="8000" dirty="0">
+              <a:rPr lang="en-US" sz="6500" dirty="0">
                 <a:latin typeface="Arial" panose="020B0604020202020204" pitchFamily="34" charset="0"/>
                 <a:ea typeface="+mj-ea"/>
                 <a:cs typeface="+mj-cs"/>
@@ -3324,7 +3290,7 @@
             </a:r>
           </a:p>
           <a:p>
-            <a:endParaRPr lang="en-US" sz="8000" dirty="0">
+            <a:endParaRPr lang="en-US" sz="6500" dirty="0">
               <a:latin typeface="Arial" panose="020B0604020202020204" pitchFamily="34" charset="0"/>
               <a:ea typeface="+mj-ea"/>
               <a:cs typeface="+mj-cs"/>
@@ -3332,16 +3298,32 @@
           </a:p>
           <a:p>
             <a:r>
-              <a:rPr lang="en-US" sz="8000" dirty="0">
+              <a:rPr lang="en-US" sz="6500" dirty="0">
                 <a:latin typeface="Arial" panose="020B0604020202020204" pitchFamily="34" charset="0"/>
                 <a:ea typeface="+mj-ea"/>
                 <a:cs typeface="+mj-cs"/>
               </a:rPr>
-              <a:t>You are about to participate in a study that was designed to examine your ability to evaluate the average emotional response of groups. </a:t>
-            </a:r>
-          </a:p>
-          <a:p>
-            <a:endParaRPr lang="en-US" sz="8000" dirty="0">
+              <a:t>You are about to participate in a study that was designed to examine your ability to evaluate the average emotional response of groups appearing </a:t>
+            </a:r>
+            <a:r>
+              <a:rPr lang="en-US" sz="6500" dirty="0" err="1">
+                <a:latin typeface="Arial" panose="020B0604020202020204" pitchFamily="34" charset="0"/>
+                <a:ea typeface="+mj-ea"/>
+                <a:cs typeface="+mj-cs"/>
+              </a:rPr>
+              <a:t>sequencially</a:t>
+            </a:r>
+            <a:r>
+              <a:rPr lang="en-US" sz="6500" dirty="0">
+                <a:latin typeface="Arial" panose="020B0604020202020204" pitchFamily="34" charset="0"/>
+                <a:ea typeface="+mj-ea"/>
+                <a:cs typeface="+mj-cs"/>
+              </a:rPr>
+              <a:t>. </a:t>
+            </a:r>
+          </a:p>
+          <a:p>
+            <a:endParaRPr lang="en-US" sz="6500" dirty="0">
               <a:latin typeface="Arial" panose="020B0604020202020204" pitchFamily="34" charset="0"/>
               <a:ea typeface="+mj-ea"/>
               <a:cs typeface="+mj-cs"/>
@@ -3349,16 +3331,16 @@
           </a:p>
           <a:p>
             <a:r>
-              <a:rPr lang="en-US" sz="8000" dirty="0">
+              <a:rPr lang="en-US" sz="6500" dirty="0">
                 <a:latin typeface="Arial" panose="020B0604020202020204" pitchFamily="34" charset="0"/>
                 <a:ea typeface="+mj-ea"/>
                 <a:cs typeface="+mj-cs"/>
               </a:rPr>
-              <a:t>You will first go through a short instructions session, then complete a short practice round, and then go participate in the actual experiment. </a:t>
-            </a:r>
-          </a:p>
-          <a:p>
-            <a:endParaRPr lang="en-US" sz="8000" dirty="0">
+              <a:t>You will first go through a short instructions session, then complete a short practice round, and then participate in the actual experiment. </a:t>
+            </a:r>
+          </a:p>
+          <a:p>
+            <a:endParaRPr lang="en-US" sz="6500" dirty="0">
               <a:latin typeface="Arial" panose="020B0604020202020204" pitchFamily="34" charset="0"/>
               <a:ea typeface="+mj-ea"/>
               <a:cs typeface="+mj-cs"/>
@@ -3366,38 +3348,16 @@
           </a:p>
           <a:p>
             <a:r>
-              <a:rPr lang="en-US" sz="8000" dirty="0">
+              <a:rPr lang="en-US" sz="6500" dirty="0">
                 <a:latin typeface="Arial" panose="020B0604020202020204" pitchFamily="34" charset="0"/>
                 <a:ea typeface="+mj-ea"/>
                 <a:cs typeface="+mj-cs"/>
               </a:rPr>
-              <a:t>The total length of this study is approximately 10-15 minutes.</a:t>
-            </a:r>
-            <a:br>
-              <a:rPr lang="en-US" sz="8000" dirty="0">
-                <a:latin typeface="Arial" panose="020B0604020202020204" pitchFamily="34" charset="0"/>
-                <a:ea typeface="+mj-ea"/>
-                <a:cs typeface="+mj-cs"/>
-              </a:rPr>
-            </a:br>
-            <a:endParaRPr lang="en-US" sz="8000" dirty="0">
-              <a:latin typeface="Arial" panose="020B0604020202020204" pitchFamily="34" charset="0"/>
-              <a:ea typeface="+mj-ea"/>
-              <a:cs typeface="+mj-cs"/>
-            </a:endParaRPr>
-          </a:p>
-          <a:p>
-            <a:r>
-              <a:rPr lang="en-US" sz="8000" dirty="0">
-                <a:latin typeface="Arial" panose="020B0604020202020204" pitchFamily="34" charset="0"/>
-                <a:ea typeface="+mj-ea"/>
-                <a:cs typeface="+mj-cs"/>
-              </a:rPr>
               <a:t>Please follow the instructions carefully.  </a:t>
             </a:r>
           </a:p>
           <a:p>
-            <a:endParaRPr lang="en-US" altLang="zh-CN" sz="6400" dirty="0">
+            <a:endParaRPr lang="en-US" altLang="zh-CN" sz="6500" dirty="0">
               <a:latin typeface="Arial" panose="020B0604020202020204" pitchFamily="34" charset="0"/>
             </a:endParaRPr>
           </a:p>
@@ -3476,7 +3436,19 @@
             </a:pPr>
             <a:r>
               <a:rPr lang="en-US" sz="5400" dirty="0"/>
-              <a:t>The goal of this study is to examine whether people can estimate the average emotional expression of multiple faces.</a:t>
+              <a:t>The goal of this study is to examine whether people can estimate the </a:t>
+            </a:r>
+            <a:r>
+              <a:rPr lang="en-US" sz="5400" dirty="0">
+                <a:solidFill>
+                  <a:srgbClr val="FF0000"/>
+                </a:solidFill>
+              </a:rPr>
+              <a:t>average emotional expression</a:t>
+            </a:r>
+            <a:r>
+              <a:rPr lang="en-US" sz="5400" dirty="0"/>
+              <a:t> of multiple faces.</a:t>
             </a:r>
             <a:br>
               <a:rPr lang="en-US" sz="5400" dirty="0"/>
@@ -3498,11 +3470,19 @@
             </a:r>
             <a:r>
               <a:rPr lang="en-US" altLang="zh-CN" sz="5400" dirty="0"/>
-              <a:t>16</a:t>
+              <a:t>a sequence of </a:t>
+            </a:r>
+            <a:r>
+              <a:rPr lang="en-US" altLang="zh-CN" sz="5400" b="1" dirty="0"/>
+              <a:t>up to 12</a:t>
+            </a:r>
+            <a:r>
+              <a:rPr lang="en-US" sz="5400" b="1" dirty="0"/>
+              <a:t> </a:t>
             </a:r>
             <a:r>
               <a:rPr lang="en-US" sz="5400" dirty="0"/>
-              <a:t> faces expressing various degrees of emotions will appear on the screen. The faces may either be expressing positive or negative emotions. </a:t>
+              <a:t>faces expressing various degrees of emotions will appear on the screen. The faces may either be expressing positive or negative emotions. </a:t>
             </a:r>
             <a:br>
               <a:rPr lang="en-US" sz="5400" dirty="0"/>
@@ -3548,51 +3528,39 @@
             </a:br>
             <a:r>
               <a:rPr lang="en-US" sz="5400" dirty="0"/>
-              <a:t>The faces will on the screen for a brief moment. In order to take all the ratings in, try to expand your attention to all the faces on the screen at the </a:t>
-            </a:r>
-            <a:br>
-              <a:rPr lang="en-US" sz="5400" dirty="0"/>
-            </a:br>
-            <a:r>
-              <a:rPr lang="en-US" sz="5400" dirty="0"/>
-              <a:t>same time. </a:t>
+              <a:t>Each face will on the screen for a brief moment. In order to take all the ratings in, try to focus your attention to each face. </a:t>
             </a:r>
           </a:p>
         </p:txBody>
       </p:sp>
       <p:pic>
         <p:nvPicPr>
-          <p:cNvPr id="6" name="Picture 5">
+          <p:cNvPr id="13" name="Picture 12">
             <a:extLst>
               <a:ext uri="{FF2B5EF4-FFF2-40B4-BE49-F238E27FC236}">
-                <a16:creationId xmlns:a16="http://schemas.microsoft.com/office/drawing/2014/main" id="{C749B214-AB29-6B49-BAD9-A3FD4295E0A2}"/>
+                <a16:creationId xmlns:a16="http://schemas.microsoft.com/office/drawing/2014/main" id="{4010F5EB-4DF2-42D0-9301-0EEBAFDE6E18}"/>
               </a:ext>
             </a:extLst>
           </p:cNvPr>
-          <p:cNvPicPr/>
+          <p:cNvPicPr>
+            <a:picLocks noChangeAspect="1"/>
+          </p:cNvPicPr>
           <p:nvPr/>
         </p:nvPicPr>
-        <p:blipFill rotWithShape="1">
+        <p:blipFill>
           <a:blip r:embed="rId2"/>
-          <a:srcRect t="7881" b="2090"/>
-          <a:stretch/>
+          <a:stretch>
+            <a:fillRect/>
+          </a:stretch>
         </p:blipFill>
-        <p:spPr bwMode="auto">
+        <p:spPr>
           <a:xfrm>
-            <a:off x="7767089" y="3877703"/>
-            <a:ext cx="8849822" cy="7732405"/>
+            <a:off x="10794119" y="6093960"/>
+            <a:ext cx="2795761" cy="3588884"/>
           </a:xfrm>
           <a:prstGeom prst="rect">
             <a:avLst/>
           </a:prstGeom>
-          <a:ln>
-            <a:noFill/>
-          </a:ln>
-          <a:extLst>
-            <a:ext uri="{53640926-AAD7-44D8-BBD7-CCE9431645EC}">
-              <a14:shadowObscured xmlns:a14="http://schemas.microsoft.com/office/drawing/2010/main"/>
-            </a:ext>
-          </a:extLst>
         </p:spPr>
       </p:pic>
     </p:spTree>
@@ -3676,7 +3644,7 @@
               <a:rPr lang="en-US" sz="5799" dirty="0">
                 <a:cs typeface="Arial" panose="020B0604020202020204" pitchFamily="34" charset="0"/>
               </a:rPr>
-              <a:t>​Following the 16 emotional faces,  a </a:t>
+              <a:t>​Following the sequence of emotional faces, a </a:t>
             </a:r>
             <a:r>
               <a:rPr lang="en-US" altLang="zh-CN" sz="5799" dirty="0">
@@ -3688,18 +3656,7 @@
               <a:rPr lang="en-US" sz="5799" dirty="0">
                 <a:cs typeface="Arial" panose="020B0604020202020204" pitchFamily="34" charset="0"/>
               </a:rPr>
-              <a:t> will appear in the middle of </a:t>
-            </a:r>
-            <a:br>
-              <a:rPr lang="en-US" sz="5799" dirty="0">
-                <a:cs typeface="Arial" panose="020B0604020202020204" pitchFamily="34" charset="0"/>
-              </a:rPr>
-            </a:br>
-            <a:r>
-              <a:rPr lang="en-US" sz="5799" dirty="0">
-                <a:cs typeface="Arial" panose="020B0604020202020204" pitchFamily="34" charset="0"/>
-              </a:rPr>
-              <a:t>the screen.  </a:t>
+              <a:t> will appear in the middle of the screen.  </a:t>
             </a:r>
             <a:br>
               <a:rPr lang="en-US" sz="5799" dirty="0">
@@ -3721,7 +3678,7 @@
               <a:rPr lang="en-US" altLang="zh-CN" sz="5799" dirty="0">
                 <a:cs typeface="Arial" panose="020B0604020202020204" pitchFamily="34" charset="0"/>
               </a:rPr>
-              <a:t>moving the scale</a:t>
+              <a:t>moving the indicator</a:t>
             </a:r>
             <a:r>
               <a:rPr lang="en-US" sz="5799" dirty="0">
@@ -3733,7 +3690,7 @@
               <a:rPr lang="en-US" sz="5799" b="1" dirty="0">
                 <a:cs typeface="Arial" panose="020B0604020202020204" pitchFamily="34" charset="0"/>
               </a:rPr>
-              <a:t>you are asked to estimate the average emotional response of the faces you just saw. </a:t>
+              <a:t>you are asked to estimate the average emotional response of the sequence of faces you just saw. </a:t>
             </a:r>
             <a:br>
               <a:rPr lang="en-US" sz="5799" b="1" dirty="0">
@@ -3749,113 +3706,8 @@
               <a:rPr lang="en-US" sz="5799" dirty="0">
                 <a:cs typeface="Arial" panose="020B0604020202020204" pitchFamily="34" charset="0"/>
               </a:rPr>
-              <a:t>You have to move the scale and click on it in order to move to the next page. Once you </a:t>
-            </a:r>
-            <a:r>
-              <a:rPr lang="en-US" altLang="zh-CN" sz="5799" dirty="0">
-                <a:cs typeface="Arial" panose="020B0604020202020204" pitchFamily="34" charset="0"/>
-              </a:rPr>
-              <a:t>click</a:t>
-            </a:r>
-            <a:r>
-              <a:rPr lang="zh-CN" altLang="en-US" sz="5799" dirty="0">
-                <a:cs typeface="Arial" panose="020B0604020202020204" pitchFamily="34" charset="0"/>
-              </a:rPr>
-              <a:t> </a:t>
-            </a:r>
-            <a:r>
-              <a:rPr lang="en-US" altLang="zh-CN" sz="5799" dirty="0">
-                <a:cs typeface="Arial" panose="020B0604020202020204" pitchFamily="34" charset="0"/>
-              </a:rPr>
-              <a:t>the</a:t>
-            </a:r>
-            <a:r>
-              <a:rPr lang="zh-CN" altLang="en-US" sz="5799" dirty="0">
-                <a:cs typeface="Arial" panose="020B0604020202020204" pitchFamily="34" charset="0"/>
-              </a:rPr>
-              <a:t> </a:t>
-            </a:r>
-            <a:r>
-              <a:rPr lang="en-US" altLang="zh-CN" sz="5799" dirty="0">
-                <a:cs typeface="Arial" panose="020B0604020202020204" pitchFamily="34" charset="0"/>
-              </a:rPr>
-              <a:t>scale,</a:t>
-            </a:r>
-            <a:r>
-              <a:rPr lang="zh-CN" altLang="en-US" sz="5799" dirty="0">
-                <a:cs typeface="Arial" panose="020B0604020202020204" pitchFamily="34" charset="0"/>
-              </a:rPr>
-              <a:t> </a:t>
-            </a:r>
-            <a:r>
-              <a:rPr lang="en-US" altLang="zh-CN" sz="5799" dirty="0">
-                <a:cs typeface="Arial" panose="020B0604020202020204" pitchFamily="34" charset="0"/>
-              </a:rPr>
-              <a:t>it</a:t>
-            </a:r>
-            <a:r>
-              <a:rPr lang="zh-CN" altLang="en-US" sz="5799" dirty="0">
-                <a:cs typeface="Arial" panose="020B0604020202020204" pitchFamily="34" charset="0"/>
-              </a:rPr>
-              <a:t> </a:t>
-            </a:r>
-            <a:r>
-              <a:rPr lang="en-US" altLang="zh-CN" sz="5799" dirty="0">
-                <a:cs typeface="Arial" panose="020B0604020202020204" pitchFamily="34" charset="0"/>
-              </a:rPr>
-              <a:t>will</a:t>
-            </a:r>
-            <a:r>
-              <a:rPr lang="zh-CN" altLang="en-US" sz="5799" dirty="0">
-                <a:cs typeface="Arial" panose="020B0604020202020204" pitchFamily="34" charset="0"/>
-              </a:rPr>
-              <a:t> </a:t>
-            </a:r>
-            <a:r>
-              <a:rPr lang="en-US" altLang="zh-CN" sz="5799" dirty="0">
-                <a:cs typeface="Arial" panose="020B0604020202020204" pitchFamily="34" charset="0"/>
-              </a:rPr>
-              <a:t>move to</a:t>
-            </a:r>
-            <a:r>
-              <a:rPr lang="zh-CN" altLang="en-US" sz="5799" dirty="0">
-                <a:cs typeface="Arial" panose="020B0604020202020204" pitchFamily="34" charset="0"/>
-              </a:rPr>
-              <a:t> </a:t>
-            </a:r>
-            <a:r>
-              <a:rPr lang="en-US" altLang="zh-CN" sz="5799" dirty="0">
-                <a:cs typeface="Arial" panose="020B0604020202020204" pitchFamily="34" charset="0"/>
-              </a:rPr>
-              <a:t>the</a:t>
-            </a:r>
-            <a:r>
-              <a:rPr lang="zh-CN" altLang="en-US" sz="5799" dirty="0">
-                <a:cs typeface="Arial" panose="020B0604020202020204" pitchFamily="34" charset="0"/>
-              </a:rPr>
-              <a:t> </a:t>
-            </a:r>
-            <a:r>
-              <a:rPr lang="en-US" altLang="zh-CN" sz="5799" dirty="0">
-                <a:cs typeface="Arial" panose="020B0604020202020204" pitchFamily="34" charset="0"/>
-              </a:rPr>
-              <a:t>next</a:t>
-            </a:r>
-            <a:r>
-              <a:rPr lang="zh-CN" altLang="en-US" sz="5799" dirty="0">
-                <a:cs typeface="Arial" panose="020B0604020202020204" pitchFamily="34" charset="0"/>
-              </a:rPr>
-              <a:t> </a:t>
-            </a:r>
-            <a:r>
-              <a:rPr lang="en-US" altLang="zh-CN" sz="5799" dirty="0">
-                <a:cs typeface="Arial" panose="020B0604020202020204" pitchFamily="34" charset="0"/>
-              </a:rPr>
-              <a:t>page.</a:t>
-            </a:r>
-            <a:endParaRPr lang="en-US" sz="5799" dirty="0">
-              <a:cs typeface="Arial" panose="020B0604020202020204" pitchFamily="34" charset="0"/>
-            </a:endParaRPr>
+              <a:t>You have to move the indicator and click on it in order to move to the next page. </a:t>
+            </a:r>
           </a:p>
         </p:txBody>
       </p:sp>
@@ -3943,8 +3795,8 @@
         </p:nvSpPr>
         <p:spPr>
           <a:xfrm>
-            <a:off x="309379" y="3896016"/>
-            <a:ext cx="25599867" cy="1783502"/>
+            <a:off x="580523" y="3873175"/>
+            <a:ext cx="24297778" cy="1783502"/>
           </a:xfrm>
           <a:prstGeom prst="rect">
             <a:avLst/>
@@ -3974,7 +3826,6 @@
             </a:lvl1pPr>
           </a:lstStyle>
           <a:p>
-            <a:pPr algn="l"/>
             <a:br>
               <a:rPr lang="en-US" altLang="zh-CN" sz="5799" dirty="0">
                 <a:latin typeface="Arial" panose="020B0604020202020204" pitchFamily="34" charset="0"/>
@@ -3986,27 +3837,55 @@
                 <a:latin typeface="Arial" panose="020B0604020202020204" pitchFamily="34" charset="0"/>
                 <a:cs typeface="Arial" panose="020B0604020202020204" pitchFamily="34" charset="0"/>
               </a:rPr>
-              <a:t>Remember, the goal here is to click one point on the scale that reflects </a:t>
-            </a:r>
-          </a:p>
-          <a:p>
-            <a:pPr algn="l"/>
+              <a:t>Remember, the goal here is provide </a:t>
+            </a:r>
+          </a:p>
+          <a:p>
+            <a:endParaRPr lang="en-US" altLang="zh-CN" sz="2000" dirty="0">
+              <a:latin typeface="Arial" panose="020B0604020202020204" pitchFamily="34" charset="0"/>
+              <a:cs typeface="Arial" panose="020B0604020202020204" pitchFamily="34" charset="0"/>
+            </a:endParaRPr>
+          </a:p>
+          <a:p>
             <a:r>
               <a:rPr lang="en-US" altLang="zh-CN" sz="5799" dirty="0">
                 <a:latin typeface="Arial" panose="020B0604020202020204" pitchFamily="34" charset="0"/>
                 <a:cs typeface="Arial" panose="020B0604020202020204" pitchFamily="34" charset="0"/>
               </a:rPr>
-              <a:t>YOUR ESTIMATION OF THE AVERAGE EMOTIONAL RESPONSES </a:t>
-            </a:r>
-          </a:p>
-          <a:p>
-            <a:pPr algn="l"/>
+              <a:t>YOUR ESTIMATION OF THE AVERAGE EMOTIONAL RESPONSE</a:t>
+            </a:r>
+            <a:r>
+              <a:rPr lang="en-US" altLang="zh-CN" sz="2000" dirty="0">
+                <a:latin typeface="Arial" panose="020B0604020202020204" pitchFamily="34" charset="0"/>
+                <a:cs typeface="Arial" panose="020B0604020202020204" pitchFamily="34" charset="0"/>
+              </a:rPr>
+              <a:t>  </a:t>
+            </a:r>
+          </a:p>
+          <a:p>
             <a:r>
               <a:rPr lang="en-US" altLang="zh-CN" sz="5799" dirty="0">
                 <a:latin typeface="Arial" panose="020B0604020202020204" pitchFamily="34" charset="0"/>
                 <a:cs typeface="Arial" panose="020B0604020202020204" pitchFamily="34" charset="0"/>
               </a:rPr>
-              <a:t>of the faces you just saw. </a:t>
+              <a:t>of the </a:t>
+            </a:r>
+            <a:r>
+              <a:rPr lang="en-US" altLang="zh-CN" sz="5799" dirty="0">
+                <a:solidFill>
+                  <a:srgbClr val="FF0000"/>
+                </a:solidFill>
+                <a:latin typeface="Arial" panose="020B0604020202020204" pitchFamily="34" charset="0"/>
+                <a:cs typeface="Arial" panose="020B0604020202020204" pitchFamily="34" charset="0"/>
+              </a:rPr>
+              <a:t>sequence</a:t>
+            </a:r>
+            <a:r>
+              <a:rPr lang="en-US" altLang="zh-CN" sz="5799" dirty="0">
+                <a:latin typeface="Arial" panose="020B0604020202020204" pitchFamily="34" charset="0"/>
+                <a:cs typeface="Arial" panose="020B0604020202020204" pitchFamily="34" charset="0"/>
+              </a:rPr>
+              <a:t> of faces you just saw. </a:t>
             </a:r>
             <a:endParaRPr lang="en-US" sz="5799" dirty="0">
               <a:latin typeface="Arial" panose="020B0604020202020204" pitchFamily="34" charset="0"/>
@@ -4037,7 +3916,7 @@
         </p:blipFill>
         <p:spPr>
           <a:xfrm>
-            <a:off x="580523" y="6857999"/>
+            <a:off x="580523" y="5640348"/>
             <a:ext cx="22867968" cy="6858001"/>
           </a:xfrm>
           <a:prstGeom prst="rect">
@@ -4286,57 +4165,6 @@
           </a:p>
         </p:txBody>
       </p:sp>
-      <mc:AlternateContent xmlns:mc="http://schemas.openxmlformats.org/markup-compatibility/2006" xmlns:p14="http://schemas.microsoft.com/office/powerpoint/2010/main">
-        <mc:Choice Requires="p14">
-          <p:contentPart p14:bwMode="auto" r:id="rId2">
-            <p14:nvContentPartPr>
-              <p14:cNvPr id="8" name="Ink 7">
-                <a:extLst>
-                  <a:ext uri="{FF2B5EF4-FFF2-40B4-BE49-F238E27FC236}">
-                    <a16:creationId xmlns:a16="http://schemas.microsoft.com/office/drawing/2014/main" id="{07A56CC6-2BAE-AE44-A7A7-584955666C25}"/>
-                  </a:ext>
-                </a:extLst>
-              </p14:cNvPr>
-              <p14:cNvContentPartPr/>
-              <p14:nvPr/>
-            </p14:nvContentPartPr>
-            <p14:xfrm>
-              <a:off x="7804159" y="7369701"/>
-              <a:ext cx="2529031" cy="436983"/>
-            </p14:xfrm>
-          </p:contentPart>
-        </mc:Choice>
-        <mc:Fallback xmlns="">
-          <p:pic>
-            <p:nvPicPr>
-              <p:cNvPr id="8" name="Ink 7">
-                <a:extLst>
-                  <a:ext uri="{FF2B5EF4-FFF2-40B4-BE49-F238E27FC236}">
-                    <a16:creationId xmlns:a16="http://schemas.microsoft.com/office/drawing/2014/main" id="{07A56CC6-2BAE-AE44-A7A7-584955666C25}"/>
-                  </a:ext>
-                </a:extLst>
-              </p:cNvPr>
-              <p:cNvPicPr/>
-              <p:nvPr/>
-            </p:nvPicPr>
-            <p:blipFill>
-              <a:blip r:embed="rId3"/>
-              <a:stretch>
-                <a:fillRect/>
-              </a:stretch>
-            </p:blipFill>
-            <p:spPr>
-              <a:xfrm>
-                <a:off x="7741158" y="7306761"/>
-                <a:ext cx="2595992" cy="562503"/>
-              </a:xfrm>
-              <a:prstGeom prst="rect">
-                <a:avLst/>
-              </a:prstGeom>
-            </p:spPr>
-          </p:pic>
-        </mc:Fallback>
-      </mc:AlternateContent>
       <p:sp>
         <p:nvSpPr>
           <p:cNvPr id="10" name="Subtitle 2">
@@ -4615,26 +4443,28 @@
       </p:sp>
       <p:pic>
         <p:nvPicPr>
-          <p:cNvPr id="6" name="Picture 5">
+          <p:cNvPr id="7" name="Picture 6">
             <a:extLst>
               <a:ext uri="{FF2B5EF4-FFF2-40B4-BE49-F238E27FC236}">
-                <a16:creationId xmlns:a16="http://schemas.microsoft.com/office/drawing/2014/main" id="{05A0A211-6FCD-C846-9EF6-8801D08BEC24}"/>
+                <a16:creationId xmlns:a16="http://schemas.microsoft.com/office/drawing/2014/main" id="{BF1500CA-DCCC-46AE-9BB0-11CC314783AC}"/>
               </a:ext>
             </a:extLst>
           </p:cNvPr>
-          <p:cNvPicPr/>
+          <p:cNvPicPr>
+            <a:picLocks noChangeAspect="1"/>
+          </p:cNvPicPr>
           <p:nvPr/>
         </p:nvPicPr>
         <p:blipFill>
-          <a:blip r:embed="rId4"/>
+          <a:blip r:embed="rId2"/>
           <a:stretch>
             <a:fillRect/>
           </a:stretch>
         </p:blipFill>
         <p:spPr>
           <a:xfrm>
-            <a:off x="6096873" y="1769462"/>
-            <a:ext cx="11878305" cy="11489337"/>
+            <a:off x="10269294" y="4559075"/>
+            <a:ext cx="2795761" cy="3588884"/>
           </a:xfrm>
           <a:prstGeom prst="rect">
             <a:avLst/>
@@ -4726,13 +4556,28 @@
                 <a:latin typeface="Arial" panose="020B0604020202020204" pitchFamily="34" charset="0"/>
                 <a:cs typeface="Arial" panose="020B0604020202020204" pitchFamily="34" charset="0"/>
               </a:rPr>
-              <a:t>Remember – the goal is for your to </a:t>
+              <a:t>Remember – the goal is to </a:t>
             </a:r>
             <a:r>
               <a:rPr lang="en-US" sz="8000" dirty="0">
                 <a:latin typeface="Arial" panose="020B0604020202020204" pitchFamily="34" charset="0"/>
               </a:rPr>
-              <a:t>ESTIMATE THE AVERAGE EMOTIONAL RESPONSES of the faces you just saw.</a:t>
+              <a:t>ESTIMATE THE AVERAGE EMOTIONAL RESPONSES of the </a:t>
+            </a:r>
+            <a:r>
+              <a:rPr lang="en-US" sz="8000" dirty="0">
+                <a:solidFill>
+                  <a:srgbClr val="FF0000"/>
+                </a:solidFill>
+                <a:latin typeface="Arial" panose="020B0604020202020204" pitchFamily="34" charset="0"/>
+              </a:rPr>
+              <a:t>sequence</a:t>
+            </a:r>
+            <a:r>
+              <a:rPr lang="en-US" sz="8000" dirty="0">
+                <a:latin typeface="Arial" panose="020B0604020202020204" pitchFamily="34" charset="0"/>
+              </a:rPr>
+              <a:t> of faces you just saw.</a:t>
             </a:r>
             <a:r>
               <a:rPr lang="en-US" altLang="zh-CN" sz="8000" b="1" dirty="0">
@@ -5076,7 +4921,22 @@
               <a:rPr lang="en-US" sz="7200" dirty="0">
                 <a:latin typeface="Arial" panose="020B0604020202020204" pitchFamily="34" charset="0"/>
               </a:rPr>
-              <a:t>ESTIMATE THE AVERAGE EMOTIONAL RESPONSES of the faces you just saw.</a:t>
+              <a:t>ESTIMATE THE AVERAGE EMOTIONAL RESPONSES of the </a:t>
+            </a:r>
+            <a:r>
+              <a:rPr lang="en-US" sz="7200" dirty="0">
+                <a:solidFill>
+                  <a:srgbClr val="FF0000"/>
+                </a:solidFill>
+                <a:latin typeface="Arial" panose="020B0604020202020204" pitchFamily="34" charset="0"/>
+              </a:rPr>
+              <a:t>sequence</a:t>
+            </a:r>
+            <a:r>
+              <a:rPr lang="en-US" sz="7200" dirty="0">
+                <a:latin typeface="Arial" panose="020B0604020202020204" pitchFamily="34" charset="0"/>
+              </a:rPr>
+              <a:t> of faces you just saw.</a:t>
             </a:r>
             <a:r>
               <a:rPr lang="en-US" altLang="zh-CN" sz="7200" b="1" dirty="0">

</xml_diff>

<commit_message>
added a single face task
</commit_message>
<xml_diff>
--- a/img/ins/instructions1.4.19.pptx
+++ b/img/ins/instructions1.4.19.pptx
@@ -269,7 +269,7 @@
           <a:p>
             <a:fld id="{22BE98DE-5B02-5640-B1FB-9B77D9687ABA}" type="datetimeFigureOut">
               <a:rPr lang="en-US" smtClean="0"/>
-              <a:t>4/15/2019</a:t>
+              <a:t>4/25/2019</a:t>
             </a:fld>
             <a:endParaRPr lang="en-US"/>
           </a:p>
@@ -439,7 +439,7 @@
           <a:p>
             <a:fld id="{22BE98DE-5B02-5640-B1FB-9B77D9687ABA}" type="datetimeFigureOut">
               <a:rPr lang="en-US" smtClean="0"/>
-              <a:t>4/15/2019</a:t>
+              <a:t>4/25/2019</a:t>
             </a:fld>
             <a:endParaRPr lang="en-US"/>
           </a:p>
@@ -619,7 +619,7 @@
           <a:p>
             <a:fld id="{22BE98DE-5B02-5640-B1FB-9B77D9687ABA}" type="datetimeFigureOut">
               <a:rPr lang="en-US" smtClean="0"/>
-              <a:t>4/15/2019</a:t>
+              <a:t>4/25/2019</a:t>
             </a:fld>
             <a:endParaRPr lang="en-US"/>
           </a:p>
@@ -789,7 +789,7 @@
           <a:p>
             <a:fld id="{22BE98DE-5B02-5640-B1FB-9B77D9687ABA}" type="datetimeFigureOut">
               <a:rPr lang="en-US" smtClean="0"/>
-              <a:t>4/15/2019</a:t>
+              <a:t>4/25/2019</a:t>
             </a:fld>
             <a:endParaRPr lang="en-US"/>
           </a:p>
@@ -1035,7 +1035,7 @@
           <a:p>
             <a:fld id="{22BE98DE-5B02-5640-B1FB-9B77D9687ABA}" type="datetimeFigureOut">
               <a:rPr lang="en-US" smtClean="0"/>
-              <a:t>4/15/2019</a:t>
+              <a:t>4/25/2019</a:t>
             </a:fld>
             <a:endParaRPr lang="en-US"/>
           </a:p>
@@ -1267,7 +1267,7 @@
           <a:p>
             <a:fld id="{22BE98DE-5B02-5640-B1FB-9B77D9687ABA}" type="datetimeFigureOut">
               <a:rPr lang="en-US" smtClean="0"/>
-              <a:t>4/15/2019</a:t>
+              <a:t>4/25/2019</a:t>
             </a:fld>
             <a:endParaRPr lang="en-US"/>
           </a:p>
@@ -1634,7 +1634,7 @@
           <a:p>
             <a:fld id="{22BE98DE-5B02-5640-B1FB-9B77D9687ABA}" type="datetimeFigureOut">
               <a:rPr lang="en-US" smtClean="0"/>
-              <a:t>4/15/2019</a:t>
+              <a:t>4/25/2019</a:t>
             </a:fld>
             <a:endParaRPr lang="en-US"/>
           </a:p>
@@ -1752,7 +1752,7 @@
           <a:p>
             <a:fld id="{22BE98DE-5B02-5640-B1FB-9B77D9687ABA}" type="datetimeFigureOut">
               <a:rPr lang="en-US" smtClean="0"/>
-              <a:t>4/15/2019</a:t>
+              <a:t>4/25/2019</a:t>
             </a:fld>
             <a:endParaRPr lang="en-US"/>
           </a:p>
@@ -1847,7 +1847,7 @@
           <a:p>
             <a:fld id="{22BE98DE-5B02-5640-B1FB-9B77D9687ABA}" type="datetimeFigureOut">
               <a:rPr lang="en-US" smtClean="0"/>
-              <a:t>4/15/2019</a:t>
+              <a:t>4/25/2019</a:t>
             </a:fld>
             <a:endParaRPr lang="en-US"/>
           </a:p>
@@ -2124,7 +2124,7 @@
           <a:p>
             <a:fld id="{22BE98DE-5B02-5640-B1FB-9B77D9687ABA}" type="datetimeFigureOut">
               <a:rPr lang="en-US" smtClean="0"/>
-              <a:t>4/15/2019</a:t>
+              <a:t>4/25/2019</a:t>
             </a:fld>
             <a:endParaRPr lang="en-US"/>
           </a:p>
@@ -2381,7 +2381,7 @@
           <a:p>
             <a:fld id="{22BE98DE-5B02-5640-B1FB-9B77D9687ABA}" type="datetimeFigureOut">
               <a:rPr lang="en-US" smtClean="0"/>
-              <a:t>4/15/2019</a:t>
+              <a:t>4/25/2019</a:t>
             </a:fld>
             <a:endParaRPr lang="en-US"/>
           </a:p>
@@ -2594,7 +2594,7 @@
             <a:fld id="{22BE98DE-5B02-5640-B1FB-9B77D9687ABA}" type="datetimeFigureOut">
               <a:rPr lang="en-US" smtClean="0"/>
               <a:pPr/>
-              <a:t>4/15/2019</a:t>
+              <a:t>4/25/2019</a:t>
             </a:fld>
             <a:endParaRPr lang="en-US" dirty="0"/>
           </a:p>
@@ -4964,7 +4964,23 @@
                 <a:ea typeface="+mj-ea"/>
                 <a:cs typeface="+mj-cs"/>
               </a:rPr>
-              <a:t>In the following section you will complete the actual study, which consists of 50 trials. The task should take 5 minutes, more or less. </a:t>
+              <a:t>In the following section you will complete the actual study, which consists of 50 trials. The task should </a:t>
+            </a:r>
+            <a:r>
+              <a:rPr lang="en-US" sz="7200">
+                <a:latin typeface="Arial" panose="020B0604020202020204" pitchFamily="34" charset="0"/>
+                <a:ea typeface="+mj-ea"/>
+                <a:cs typeface="+mj-cs"/>
+              </a:rPr>
+              <a:t>take 25 </a:t>
+            </a:r>
+            <a:r>
+              <a:rPr lang="en-US" sz="7200" dirty="0">
+                <a:latin typeface="Arial" panose="020B0604020202020204" pitchFamily="34" charset="0"/>
+                <a:ea typeface="+mj-ea"/>
+                <a:cs typeface="+mj-cs"/>
+              </a:rPr>
+              <a:t>minutes, more or less. </a:t>
             </a:r>
           </a:p>
           <a:p>

</xml_diff>

<commit_message>
revisions to the task. Ready to go
</commit_message>
<xml_diff>
--- a/img/ins/instructions1.4.19.pptx
+++ b/img/ins/instructions1.4.19.pptx
@@ -7,12 +7,13 @@
   <p:sldIdLst>
     <p:sldId id="267" r:id="rId2"/>
     <p:sldId id="268" r:id="rId3"/>
-    <p:sldId id="257" r:id="rId4"/>
-    <p:sldId id="269" r:id="rId5"/>
-    <p:sldId id="270" r:id="rId6"/>
-    <p:sldId id="263" r:id="rId7"/>
-    <p:sldId id="260" r:id="rId8"/>
-    <p:sldId id="271" r:id="rId9"/>
+    <p:sldId id="272" r:id="rId4"/>
+    <p:sldId id="257" r:id="rId5"/>
+    <p:sldId id="269" r:id="rId6"/>
+    <p:sldId id="270" r:id="rId7"/>
+    <p:sldId id="263" r:id="rId8"/>
+    <p:sldId id="260" r:id="rId9"/>
+    <p:sldId id="271" r:id="rId10"/>
   </p:sldIdLst>
   <p:sldSz cx="24384000" cy="13716000"/>
   <p:notesSz cx="6858000" cy="9144000"/>
@@ -269,7 +270,7 @@
           <a:p>
             <a:fld id="{22BE98DE-5B02-5640-B1FB-9B77D9687ABA}" type="datetimeFigureOut">
               <a:rPr lang="en-US" smtClean="0"/>
-              <a:t>4/25/2019</a:t>
+              <a:t>1/17/2020</a:t>
             </a:fld>
             <a:endParaRPr lang="en-US"/>
           </a:p>
@@ -439,7 +440,7 @@
           <a:p>
             <a:fld id="{22BE98DE-5B02-5640-B1FB-9B77D9687ABA}" type="datetimeFigureOut">
               <a:rPr lang="en-US" smtClean="0"/>
-              <a:t>4/25/2019</a:t>
+              <a:t>1/17/2020</a:t>
             </a:fld>
             <a:endParaRPr lang="en-US"/>
           </a:p>
@@ -619,7 +620,7 @@
           <a:p>
             <a:fld id="{22BE98DE-5B02-5640-B1FB-9B77D9687ABA}" type="datetimeFigureOut">
               <a:rPr lang="en-US" smtClean="0"/>
-              <a:t>4/25/2019</a:t>
+              <a:t>1/17/2020</a:t>
             </a:fld>
             <a:endParaRPr lang="en-US"/>
           </a:p>
@@ -789,7 +790,7 @@
           <a:p>
             <a:fld id="{22BE98DE-5B02-5640-B1FB-9B77D9687ABA}" type="datetimeFigureOut">
               <a:rPr lang="en-US" smtClean="0"/>
-              <a:t>4/25/2019</a:t>
+              <a:t>1/17/2020</a:t>
             </a:fld>
             <a:endParaRPr lang="en-US"/>
           </a:p>
@@ -1035,7 +1036,7 @@
           <a:p>
             <a:fld id="{22BE98DE-5B02-5640-B1FB-9B77D9687ABA}" type="datetimeFigureOut">
               <a:rPr lang="en-US" smtClean="0"/>
-              <a:t>4/25/2019</a:t>
+              <a:t>1/17/2020</a:t>
             </a:fld>
             <a:endParaRPr lang="en-US"/>
           </a:p>
@@ -1267,7 +1268,7 @@
           <a:p>
             <a:fld id="{22BE98DE-5B02-5640-B1FB-9B77D9687ABA}" type="datetimeFigureOut">
               <a:rPr lang="en-US" smtClean="0"/>
-              <a:t>4/25/2019</a:t>
+              <a:t>1/17/2020</a:t>
             </a:fld>
             <a:endParaRPr lang="en-US"/>
           </a:p>
@@ -1634,7 +1635,7 @@
           <a:p>
             <a:fld id="{22BE98DE-5B02-5640-B1FB-9B77D9687ABA}" type="datetimeFigureOut">
               <a:rPr lang="en-US" smtClean="0"/>
-              <a:t>4/25/2019</a:t>
+              <a:t>1/17/2020</a:t>
             </a:fld>
             <a:endParaRPr lang="en-US"/>
           </a:p>
@@ -1752,7 +1753,7 @@
           <a:p>
             <a:fld id="{22BE98DE-5B02-5640-B1FB-9B77D9687ABA}" type="datetimeFigureOut">
               <a:rPr lang="en-US" smtClean="0"/>
-              <a:t>4/25/2019</a:t>
+              <a:t>1/17/2020</a:t>
             </a:fld>
             <a:endParaRPr lang="en-US"/>
           </a:p>
@@ -1847,7 +1848,7 @@
           <a:p>
             <a:fld id="{22BE98DE-5B02-5640-B1FB-9B77D9687ABA}" type="datetimeFigureOut">
               <a:rPr lang="en-US" smtClean="0"/>
-              <a:t>4/25/2019</a:t>
+              <a:t>1/17/2020</a:t>
             </a:fld>
             <a:endParaRPr lang="en-US"/>
           </a:p>
@@ -2124,7 +2125,7 @@
           <a:p>
             <a:fld id="{22BE98DE-5B02-5640-B1FB-9B77D9687ABA}" type="datetimeFigureOut">
               <a:rPr lang="en-US" smtClean="0"/>
-              <a:t>4/25/2019</a:t>
+              <a:t>1/17/2020</a:t>
             </a:fld>
             <a:endParaRPr lang="en-US"/>
           </a:p>
@@ -2381,7 +2382,7 @@
           <a:p>
             <a:fld id="{22BE98DE-5B02-5640-B1FB-9B77D9687ABA}" type="datetimeFigureOut">
               <a:rPr lang="en-US" smtClean="0"/>
-              <a:t>4/25/2019</a:t>
+              <a:t>1/17/2020</a:t>
             </a:fld>
             <a:endParaRPr lang="en-US"/>
           </a:p>
@@ -2594,7 +2595,7 @@
             <a:fld id="{22BE98DE-5B02-5640-B1FB-9B77D9687ABA}" type="datetimeFigureOut">
               <a:rPr lang="en-US" smtClean="0"/>
               <a:pPr/>
-              <a:t>4/25/2019</a:t>
+              <a:t>1/17/2020</a:t>
             </a:fld>
             <a:endParaRPr lang="en-US" dirty="0"/>
           </a:p>
@@ -3303,23 +3304,7 @@
                 <a:ea typeface="+mj-ea"/>
                 <a:cs typeface="+mj-cs"/>
               </a:rPr>
-              <a:t>You are about to participate in a study that was designed to examine your ability to evaluate the average emotional response of groups appearing </a:t>
-            </a:r>
-            <a:r>
-              <a:rPr lang="en-US" sz="6500" dirty="0" err="1">
-                <a:latin typeface="Arial" panose="020B0604020202020204" pitchFamily="34" charset="0"/>
-                <a:ea typeface="+mj-ea"/>
-                <a:cs typeface="+mj-cs"/>
-              </a:rPr>
-              <a:t>sequencially</a:t>
-            </a:r>
-            <a:r>
-              <a:rPr lang="en-US" sz="6500" dirty="0">
-                <a:latin typeface="Arial" panose="020B0604020202020204" pitchFamily="34" charset="0"/>
-                <a:ea typeface="+mj-ea"/>
-                <a:cs typeface="+mj-cs"/>
-              </a:rPr>
-              <a:t>. </a:t>
+              <a:t>You are about to participate in a study that was designed to examine your ability to evaluate the emotional response of faces expressing emotion. </a:t>
             </a:r>
           </a:p>
           <a:p>
@@ -3419,8 +3404,8 @@
         </p:nvSpPr>
         <p:spPr>
           <a:xfrm>
-            <a:off x="412954" y="12949084"/>
-            <a:ext cx="24465530" cy="766916"/>
+            <a:off x="734786" y="12410241"/>
+            <a:ext cx="23649214" cy="766916"/>
           </a:xfrm>
         </p:spPr>
         <p:txBody>
@@ -3436,7 +3421,26 @@
             </a:pPr>
             <a:r>
               <a:rPr lang="en-US" sz="5400" dirty="0"/>
-              <a:t>The goal of this study is to examine whether people can estimate the </a:t>
+              <a:t>The goal of this study is to examine whether people can estimate </a:t>
+            </a:r>
+            <a:r>
+              <a:rPr lang="en-US" sz="5400" dirty="0" smtClean="0"/>
+              <a:t>the </a:t>
+            </a:r>
+            <a:br>
+              <a:rPr lang="en-US" sz="5400" dirty="0" smtClean="0"/>
+            </a:br>
+            <a:r>
+              <a:rPr lang="en-US" sz="5400" dirty="0" smtClean="0">
+                <a:solidFill>
+                  <a:srgbClr val="FF0000"/>
+                </a:solidFill>
+              </a:rPr>
+              <a:t>average</a:t>
+            </a:r>
+            <a:r>
+              <a:rPr lang="en-US" sz="5400" dirty="0" smtClean="0"/>
+              <a:t> </a:t>
             </a:r>
             <a:r>
               <a:rPr lang="en-US" sz="5400" dirty="0">
@@ -3444,11 +3448,19 @@
                   <a:srgbClr val="FF0000"/>
                 </a:solidFill>
               </a:rPr>
-              <a:t>average emotional expression</a:t>
+              <a:t>emotional expression</a:t>
             </a:r>
             <a:r>
               <a:rPr lang="en-US" sz="5400" dirty="0"/>
-              <a:t> of multiple faces.</a:t>
+              <a:t> of </a:t>
+            </a:r>
+            <a:r>
+              <a:rPr lang="en-US" sz="5400" dirty="0" smtClean="0"/>
+              <a:t>face sequences.</a:t>
+            </a:r>
+            <a:r>
+              <a:rPr lang="en-US" sz="5400" dirty="0"/>
+              <a:t/>
             </a:r>
             <a:br>
               <a:rPr lang="en-US" sz="5400" dirty="0"/>
@@ -3469,66 +3481,127 @@
               <a:t> </a:t>
             </a:r>
             <a:r>
-              <a:rPr lang="en-US" altLang="zh-CN" sz="5400" dirty="0"/>
-              <a:t>a sequence of </a:t>
-            </a:r>
-            <a:r>
-              <a:rPr lang="en-US" altLang="zh-CN" sz="5400" b="1" dirty="0"/>
-              <a:t>up to 12</a:t>
-            </a:r>
-            <a:r>
-              <a:rPr lang="en-US" sz="5400" b="1" dirty="0"/>
-              <a:t> </a:t>
+              <a:rPr lang="en-US" altLang="zh-CN" sz="5400" dirty="0" smtClean="0"/>
+              <a:t>a series of faces </a:t>
             </a:r>
             <a:r>
               <a:rPr lang="en-US" sz="5400" dirty="0"/>
-              <a:t>faces expressing various degrees of emotions will appear on the screen. The faces may either be expressing positive or negative emotions. </a:t>
+              <a:t>expressing various degrees of emotions will appear on the screen. The </a:t>
+            </a:r>
+            <a:r>
+              <a:rPr lang="en-US" sz="5400" dirty="0" smtClean="0"/>
+              <a:t>face sequence </a:t>
+            </a:r>
+            <a:r>
+              <a:rPr lang="en-US" sz="5400" dirty="0"/>
+              <a:t>may either be expressing positive or negative emotions. </a:t>
             </a:r>
             <a:br>
               <a:rPr lang="en-US" sz="5400" dirty="0"/>
             </a:br>
+            <a:r>
+              <a:rPr lang="en-US" sz="5400" dirty="0"/>
+              <a:t/>
+            </a:r>
             <a:br>
               <a:rPr lang="en-US" sz="5400" dirty="0"/>
             </a:br>
+            <a:r>
+              <a:rPr lang="en-US" sz="5400" dirty="0"/>
+              <a:t/>
+            </a:r>
             <a:br>
               <a:rPr lang="en-US" sz="5400" dirty="0"/>
             </a:br>
+            <a:r>
+              <a:rPr lang="en-US" sz="5400" dirty="0"/>
+              <a:t/>
+            </a:r>
             <a:br>
               <a:rPr lang="en-US" sz="5400" dirty="0"/>
             </a:br>
+            <a:r>
+              <a:rPr lang="en-US" sz="5400" dirty="0"/>
+              <a:t/>
+            </a:r>
             <a:br>
               <a:rPr lang="en-US" sz="5400" dirty="0"/>
             </a:br>
+            <a:r>
+              <a:rPr lang="en-US" sz="5400" dirty="0"/>
+              <a:t/>
+            </a:r>
             <a:br>
               <a:rPr lang="en-US" sz="5400" dirty="0"/>
             </a:br>
+            <a:r>
+              <a:rPr lang="en-US" sz="5400" dirty="0"/>
+              <a:t/>
+            </a:r>
             <a:br>
               <a:rPr lang="en-US" sz="5400" dirty="0"/>
             </a:br>
+            <a:r>
+              <a:rPr lang="en-US" sz="5400" dirty="0"/>
+              <a:t/>
+            </a:r>
             <a:br>
               <a:rPr lang="en-US" sz="5400" dirty="0"/>
             </a:br>
+            <a:r>
+              <a:rPr lang="en-US" sz="5400" dirty="0"/>
+              <a:t/>
+            </a:r>
             <a:br>
               <a:rPr lang="en-US" sz="5400" dirty="0"/>
             </a:br>
+            <a:r>
+              <a:rPr lang="en-US" sz="5400" dirty="0"/>
+              <a:t/>
+            </a:r>
             <a:br>
               <a:rPr lang="en-US" sz="5400" dirty="0"/>
             </a:br>
+            <a:r>
+              <a:rPr lang="en-US" sz="5400" dirty="0"/>
+              <a:t/>
+            </a:r>
             <a:br>
               <a:rPr lang="en-US" sz="5400" dirty="0"/>
             </a:br>
+            <a:r>
+              <a:rPr lang="en-US" sz="5400" dirty="0"/>
+              <a:t/>
+            </a:r>
             <a:br>
               <a:rPr lang="en-US" sz="5400" dirty="0"/>
             </a:br>
+            <a:r>
+              <a:rPr lang="en-US" sz="5400" dirty="0"/>
+              <a:t/>
+            </a:r>
             <a:br>
               <a:rPr lang="en-US" sz="5400" dirty="0"/>
             </a:br>
-            <a:br>
+            <a:r>
               <a:rPr lang="en-US" sz="5400" dirty="0"/>
-            </a:br>
+              <a:t>The </a:t>
+            </a:r>
+            <a:r>
+              <a:rPr lang="en-US" sz="5400" dirty="0" smtClean="0"/>
+              <a:t>face sequence </a:t>
+            </a:r>
             <a:r>
               <a:rPr lang="en-US" sz="5400" dirty="0"/>
-              <a:t>Each face will on the screen for a brief moment. In order to take all the ratings in, try to focus your attention to each face. </a:t>
+              <a:t>will </a:t>
+            </a:r>
+            <a:r>
+              <a:rPr lang="en-US" sz="5400" dirty="0" smtClean="0"/>
+              <a:t>be on </a:t>
+            </a:r>
+            <a:r>
+              <a:rPr lang="en-US" sz="5400" dirty="0"/>
+              <a:t>the screen for a brief moment. In order to take all the ratings in, try to focus your attention on it as much as possible. </a:t>
             </a:r>
           </a:p>
         </p:txBody>
@@ -3619,8 +3692,8 @@
         </p:nvSpPr>
         <p:spPr>
           <a:xfrm>
-            <a:off x="341984" y="5074497"/>
-            <a:ext cx="24042016" cy="1783502"/>
+            <a:off x="5244353" y="2573344"/>
+            <a:ext cx="18440400" cy="1783502"/>
           </a:xfrm>
         </p:spPr>
         <p:txBody>
@@ -3630,11 +3703,23 @@
           <a:lstStyle/>
           <a:p>
             <a:pPr algn="l"/>
+            <a:r>
+              <a:rPr lang="en-US" altLang="zh-CN" sz="5799" dirty="0">
+                <a:cs typeface="Arial" panose="020B0604020202020204" pitchFamily="34" charset="0"/>
+              </a:rPr>
+              <a:t/>
+            </a:r>
             <a:br>
               <a:rPr lang="en-US" altLang="zh-CN" sz="5799" dirty="0">
                 <a:cs typeface="Arial" panose="020B0604020202020204" pitchFamily="34" charset="0"/>
               </a:rPr>
             </a:br>
+            <a:r>
+              <a:rPr lang="en-US" altLang="zh-CN" sz="5799" dirty="0">
+                <a:cs typeface="Arial" panose="020B0604020202020204" pitchFamily="34" charset="0"/>
+              </a:rPr>
+              <a:t/>
+            </a:r>
             <a:br>
               <a:rPr lang="en-US" altLang="zh-CN" sz="5799" dirty="0">
                 <a:cs typeface="Arial" panose="020B0604020202020204" pitchFamily="34" charset="0"/>
@@ -3644,107 +3729,155 @@
               <a:rPr lang="en-US" sz="5799" dirty="0">
                 <a:cs typeface="Arial" panose="020B0604020202020204" pitchFamily="34" charset="0"/>
               </a:rPr>
-              <a:t>​Following the sequence of emotional faces, a </a:t>
-            </a:r>
-            <a:r>
-              <a:rPr lang="en-US" altLang="zh-CN" sz="5799" dirty="0">
-                <a:cs typeface="Arial" panose="020B0604020202020204" pitchFamily="34" charset="0"/>
-              </a:rPr>
-              <a:t>scale</a:t>
+              <a:t>​Following the </a:t>
+            </a:r>
+            <a:r>
+              <a:rPr lang="en-US" sz="5799" dirty="0" smtClean="0">
+                <a:cs typeface="Arial" panose="020B0604020202020204" pitchFamily="34" charset="0"/>
+              </a:rPr>
+              <a:t>face sequence,</a:t>
             </a:r>
             <a:r>
               <a:rPr lang="en-US" sz="5799" dirty="0">
                 <a:cs typeface="Arial" panose="020B0604020202020204" pitchFamily="34" charset="0"/>
               </a:rPr>
-              <a:t> will appear in the middle of the screen.  </a:t>
+              <a:t> </a:t>
+            </a:r>
+            <a:r>
+              <a:rPr lang="en-US" sz="5799" dirty="0" smtClean="0">
+                <a:cs typeface="Arial" panose="020B0604020202020204" pitchFamily="34" charset="0"/>
+              </a:rPr>
+              <a:t>you will be asked to move the mouse left of the line to begin the rating phase</a:t>
+            </a:r>
+            <a:r>
+              <a:rPr lang="en-US" sz="5799" dirty="0">
+                <a:cs typeface="Arial" panose="020B0604020202020204" pitchFamily="34" charset="0"/>
+              </a:rPr>
+              <a:t/>
             </a:r>
             <a:br>
               <a:rPr lang="en-US" sz="5799" dirty="0">
                 <a:cs typeface="Arial" panose="020B0604020202020204" pitchFamily="34" charset="0"/>
               </a:rPr>
             </a:br>
+            <a:r>
+              <a:rPr lang="en-US" sz="5799" dirty="0">
+                <a:cs typeface="Arial" panose="020B0604020202020204" pitchFamily="34" charset="0"/>
+              </a:rPr>
+              <a:t/>
+            </a:r>
             <a:br>
               <a:rPr lang="en-US" sz="5799" dirty="0">
                 <a:cs typeface="Arial" panose="020B0604020202020204" pitchFamily="34" charset="0"/>
               </a:rPr>
             </a:br>
-            <a:r>
-              <a:rPr lang="en-US" sz="5799" dirty="0">
-                <a:cs typeface="Arial" panose="020B0604020202020204" pitchFamily="34" charset="0"/>
-              </a:rPr>
-              <a:t>By </a:t>
-            </a:r>
-            <a:r>
-              <a:rPr lang="en-US" altLang="zh-CN" sz="5799" dirty="0">
-                <a:cs typeface="Arial" panose="020B0604020202020204" pitchFamily="34" charset="0"/>
-              </a:rPr>
-              <a:t>moving the indicator</a:t>
-            </a:r>
-            <a:r>
-              <a:rPr lang="en-US" sz="5799" dirty="0">
-                <a:cs typeface="Arial" panose="020B0604020202020204" pitchFamily="34" charset="0"/>
-              </a:rPr>
-              <a:t>, </a:t>
-            </a:r>
-            <a:r>
-              <a:rPr lang="en-US" sz="5799" b="1" dirty="0">
-                <a:cs typeface="Arial" panose="020B0604020202020204" pitchFamily="34" charset="0"/>
-              </a:rPr>
-              <a:t>you are asked to estimate the average emotional response of the sequence of faces you just saw. </a:t>
-            </a:r>
-            <a:br>
-              <a:rPr lang="en-US" sz="5799" b="1" dirty="0">
-                <a:cs typeface="Arial" panose="020B0604020202020204" pitchFamily="34" charset="0"/>
-              </a:rPr>
-            </a:br>
-            <a:br>
-              <a:rPr lang="en-US" sz="5799" b="1" dirty="0">
-                <a:cs typeface="Arial" panose="020B0604020202020204" pitchFamily="34" charset="0"/>
-              </a:rPr>
-            </a:br>
-            <a:r>
-              <a:rPr lang="en-US" sz="5799" dirty="0">
-                <a:cs typeface="Arial" panose="020B0604020202020204" pitchFamily="34" charset="0"/>
-              </a:rPr>
-              <a:t>You have to move the indicator and click on it in order to move to the next page. </a:t>
-            </a:r>
-          </a:p>
-        </p:txBody>
-      </p:sp>
-      <p:pic>
-        <p:nvPicPr>
-          <p:cNvPr id="5" name="Picture 4">
+            <a:endParaRPr lang="en-US" sz="5799" dirty="0">
+              <a:cs typeface="Arial" panose="020B0604020202020204" pitchFamily="34" charset="0"/>
+            </a:endParaRPr>
+          </a:p>
+        </p:txBody>
+      </p:sp>
+      <p:cxnSp>
+        <p:nvCxnSpPr>
+          <p:cNvPr id="4" name="Straight Connector 3"/>
+          <p:cNvCxnSpPr/>
+          <p:nvPr/>
+        </p:nvCxnSpPr>
+        <p:spPr>
+          <a:xfrm>
+            <a:off x="2877671" y="0"/>
+            <a:ext cx="0" cy="13716000"/>
+          </a:xfrm>
+          <a:prstGeom prst="line">
+            <a:avLst/>
+          </a:prstGeom>
+          <a:ln w="57150">
+            <a:solidFill>
+              <a:schemeClr val="tx1"/>
+            </a:solidFill>
+          </a:ln>
+        </p:spPr>
+        <p:style>
+          <a:lnRef idx="1">
+            <a:schemeClr val="accent1"/>
+          </a:lnRef>
+          <a:fillRef idx="0">
+            <a:schemeClr val="accent1"/>
+          </a:fillRef>
+          <a:effectRef idx="0">
+            <a:schemeClr val="accent1"/>
+          </a:effectRef>
+          <a:fontRef idx="minor">
+            <a:schemeClr val="tx1"/>
+          </a:fontRef>
+        </p:style>
+      </p:cxnSp>
+      <p:sp>
+        <p:nvSpPr>
+          <p:cNvPr id="7" name="Title 1">
             <a:extLst>
               <a:ext uri="{FF2B5EF4-FFF2-40B4-BE49-F238E27FC236}">
-                <a16:creationId xmlns:a16="http://schemas.microsoft.com/office/drawing/2014/main" id="{C927A0F9-6710-6A4F-BF01-6EF7FFB7F3EC}"/>
+                <a16:creationId xmlns:a16="http://schemas.microsoft.com/office/drawing/2014/main" id="{21DCC761-EEA5-3B4F-AEC8-ED98BC41E974}"/>
               </a:ext>
             </a:extLst>
           </p:cNvPr>
-          <p:cNvPicPr>
-            <a:picLocks noChangeAspect="1"/>
-          </p:cNvPicPr>
+          <p:cNvSpPr txBox="1">
+            <a:spLocks/>
+          </p:cNvSpPr>
           <p:nvPr/>
-        </p:nvPicPr>
-        <p:blipFill>
-          <a:blip r:embed="rId2"/>
-          <a:stretch>
-            <a:fillRect/>
-          </a:stretch>
-        </p:blipFill>
+        </p:nvSpPr>
         <p:spPr>
           <a:xfrm>
-            <a:off x="580523" y="6857999"/>
-            <a:ext cx="22867968" cy="6858001"/>
+            <a:off x="3487270" y="5562837"/>
+            <a:ext cx="18440400" cy="1783502"/>
           </a:xfrm>
           <a:prstGeom prst="rect">
             <a:avLst/>
           </a:prstGeom>
         </p:spPr>
-      </p:pic>
+        <p:txBody>
+          <a:bodyPr vert="horz" lIns="91440" tIns="45720" rIns="91440" bIns="45720" rtlCol="0" anchor="b">
+            <a:noAutofit/>
+          </a:bodyPr>
+          <a:lstStyle>
+            <a:lvl1pPr algn="ctr" defTabSz="1828800" rtl="0" eaLnBrk="1" latinLnBrk="0" hangingPunct="1">
+              <a:lnSpc>
+                <a:spcPct val="90000"/>
+              </a:lnSpc>
+              <a:spcBef>
+                <a:spcPct val="0"/>
+              </a:spcBef>
+              <a:buNone/>
+              <a:defRPr sz="12000" b="0" i="0" kern="1200">
+                <a:solidFill>
+                  <a:schemeClr val="tx1"/>
+                </a:solidFill>
+                <a:latin typeface="Arial" panose="020B0604020202020204" pitchFamily="34" charset="0"/>
+                <a:ea typeface="+mj-ea"/>
+                <a:cs typeface="+mj-cs"/>
+              </a:defRPr>
+            </a:lvl1pPr>
+          </a:lstStyle>
+          <a:p>
+            <a:pPr algn="l"/>
+            <a:r>
+              <a:rPr lang="en-US" altLang="zh-CN" sz="5799" dirty="0">
+                <a:latin typeface="+mj-lt"/>
+                <a:cs typeface="Arial" panose="020B0604020202020204" pitchFamily="34" charset="0"/>
+              </a:rPr>
+              <a:t>Move mouse left of the line to begin</a:t>
+            </a:r>
+            <a:endParaRPr lang="en-US" sz="5799" dirty="0">
+              <a:latin typeface="+mj-lt"/>
+              <a:cs typeface="Arial" panose="020B0604020202020204" pitchFamily="34" charset="0"/>
+            </a:endParaRPr>
+          </a:p>
+        </p:txBody>
+      </p:sp>
     </p:spTree>
     <p:extLst>
       <p:ext uri="{BB962C8B-B14F-4D97-AF65-F5344CB8AC3E}">
-        <p14:creationId xmlns:p14="http://schemas.microsoft.com/office/powerpoint/2010/main" val="1787496859"/>
+        <p14:creationId xmlns:p14="http://schemas.microsoft.com/office/powerpoint/2010/main" val="2372441797"/>
       </p:ext>
     </p:extLst>
   </p:cSld>
@@ -3781,114 +3914,169 @@
       </p:grpSpPr>
       <p:sp>
         <p:nvSpPr>
-          <p:cNvPr id="7" name="Title 1">
+          <p:cNvPr id="2" name="Title 1">
             <a:extLst>
               <a:ext uri="{FF2B5EF4-FFF2-40B4-BE49-F238E27FC236}">
-                <a16:creationId xmlns:a16="http://schemas.microsoft.com/office/drawing/2014/main" id="{AC1207DB-B1B9-2640-A8F7-AF32188774C8}"/>
+                <a16:creationId xmlns:a16="http://schemas.microsoft.com/office/drawing/2014/main" id="{21DCC761-EEA5-3B4F-AEC8-ED98BC41E974}"/>
               </a:ext>
             </a:extLst>
           </p:cNvPr>
-          <p:cNvSpPr txBox="1">
-            <a:spLocks/>
-          </p:cNvSpPr>
-          <p:nvPr/>
+          <p:cNvSpPr>
+            <a:spLocks noGrp="1"/>
+          </p:cNvSpPr>
+          <p:nvPr>
+            <p:ph type="ctrTitle"/>
+          </p:nvPr>
         </p:nvSpPr>
         <p:spPr>
           <a:xfrm>
-            <a:off x="580523" y="3873175"/>
-            <a:ext cx="24297778" cy="1783502"/>
+            <a:off x="341984" y="5693062"/>
+            <a:ext cx="24042016" cy="1783502"/>
           </a:xfrm>
-          <a:prstGeom prst="rect">
-            <a:avLst/>
-          </a:prstGeom>
         </p:spPr>
         <p:txBody>
-          <a:bodyPr vert="horz" lIns="182856" tIns="91428" rIns="182856" bIns="91428" rtlCol="0" anchor="b">
+          <a:bodyPr>
             <a:noAutofit/>
           </a:bodyPr>
-          <a:lstStyle>
-            <a:lvl1pPr algn="ctr" defTabSz="914400" rtl="0" eaLnBrk="1" latinLnBrk="0" hangingPunct="1">
-              <a:lnSpc>
-                <a:spcPct val="90000"/>
-              </a:lnSpc>
-              <a:spcBef>
-                <a:spcPct val="0"/>
-              </a:spcBef>
-              <a:buNone/>
-              <a:defRPr sz="6000" kern="1200">
-                <a:solidFill>
-                  <a:schemeClr val="tx1"/>
-                </a:solidFill>
-                <a:latin typeface="+mj-lt"/>
-                <a:ea typeface="+mj-ea"/>
-                <a:cs typeface="+mj-cs"/>
-              </a:defRPr>
-            </a:lvl1pPr>
-          </a:lstStyle>
-          <a:p>
+          <a:lstStyle/>
+          <a:p>
+            <a:pPr algn="l"/>
+            <a:r>
+              <a:rPr lang="en-US" altLang="zh-CN" sz="5799" dirty="0">
+                <a:cs typeface="Arial" panose="020B0604020202020204" pitchFamily="34" charset="0"/>
+              </a:rPr>
+              <a:t/>
+            </a:r>
             <a:br>
               <a:rPr lang="en-US" altLang="zh-CN" sz="5799" dirty="0">
-                <a:latin typeface="Arial" panose="020B0604020202020204" pitchFamily="34" charset="0"/>
                 <a:cs typeface="Arial" panose="020B0604020202020204" pitchFamily="34" charset="0"/>
               </a:rPr>
             </a:br>
             <a:r>
               <a:rPr lang="en-US" altLang="zh-CN" sz="5799" dirty="0">
-                <a:latin typeface="Arial" panose="020B0604020202020204" pitchFamily="34" charset="0"/>
-                <a:cs typeface="Arial" panose="020B0604020202020204" pitchFamily="34" charset="0"/>
-              </a:rPr>
-              <a:t>Remember, the goal here is provide </a:t>
-            </a:r>
-          </a:p>
-          <a:p>
-            <a:endParaRPr lang="en-US" altLang="zh-CN" sz="2000" dirty="0">
-              <a:latin typeface="Arial" panose="020B0604020202020204" pitchFamily="34" charset="0"/>
-              <a:cs typeface="Arial" panose="020B0604020202020204" pitchFamily="34" charset="0"/>
-            </a:endParaRPr>
-          </a:p>
-          <a:p>
-            <a:r>
+                <a:cs typeface="Arial" panose="020B0604020202020204" pitchFamily="34" charset="0"/>
+              </a:rPr>
+              <a:t/>
+            </a:r>
+            <a:br>
               <a:rPr lang="en-US" altLang="zh-CN" sz="5799" dirty="0">
-                <a:latin typeface="Arial" panose="020B0604020202020204" pitchFamily="34" charset="0"/>
-                <a:cs typeface="Arial" panose="020B0604020202020204" pitchFamily="34" charset="0"/>
-              </a:rPr>
-              <a:t>YOUR ESTIMATION OF THE AVERAGE EMOTIONAL RESPONSE</a:t>
-            </a:r>
-            <a:r>
-              <a:rPr lang="en-US" altLang="zh-CN" sz="2000" dirty="0">
-                <a:latin typeface="Arial" panose="020B0604020202020204" pitchFamily="34" charset="0"/>
-                <a:cs typeface="Arial" panose="020B0604020202020204" pitchFamily="34" charset="0"/>
-              </a:rPr>
-              <a:t>  </a:t>
-            </a:r>
-          </a:p>
-          <a:p>
-            <a:r>
-              <a:rPr lang="en-US" altLang="zh-CN" sz="5799" dirty="0">
-                <a:latin typeface="Arial" panose="020B0604020202020204" pitchFamily="34" charset="0"/>
-                <a:cs typeface="Arial" panose="020B0604020202020204" pitchFamily="34" charset="0"/>
-              </a:rPr>
-              <a:t>of the </a:t>
-            </a:r>
-            <a:r>
-              <a:rPr lang="en-US" altLang="zh-CN" sz="5799" dirty="0">
+                <a:cs typeface="Arial" panose="020B0604020202020204" pitchFamily="34" charset="0"/>
+              </a:rPr>
+            </a:br>
+            <a:r>
+              <a:rPr lang="en-US" sz="5799" dirty="0" smtClean="0">
+                <a:cs typeface="Arial" panose="020B0604020202020204" pitchFamily="34" charset="0"/>
+              </a:rPr>
+              <a:t>​A face will then appear on the screen. When you move your mouse, the face will change from being neutral to expressing emotion</a:t>
+            </a:r>
+            <a:r>
+              <a:rPr lang="en-US" sz="5799" dirty="0">
+                <a:cs typeface="Arial" panose="020B0604020202020204" pitchFamily="34" charset="0"/>
+              </a:rPr>
+              <a:t>  </a:t>
+            </a:r>
+            <a:br>
+              <a:rPr lang="en-US" sz="5799" dirty="0">
+                <a:cs typeface="Arial" panose="020B0604020202020204" pitchFamily="34" charset="0"/>
+              </a:rPr>
+            </a:br>
+            <a:r>
+              <a:rPr lang="en-US" sz="5799" dirty="0">
+                <a:cs typeface="Arial" panose="020B0604020202020204" pitchFamily="34" charset="0"/>
+              </a:rPr>
+              <a:t/>
+            </a:r>
+            <a:br>
+              <a:rPr lang="en-US" sz="5799" dirty="0">
+                <a:cs typeface="Arial" panose="020B0604020202020204" pitchFamily="34" charset="0"/>
+              </a:rPr>
+            </a:br>
+            <a:r>
+              <a:rPr lang="en-US" sz="5799" dirty="0">
+                <a:cs typeface="Arial" panose="020B0604020202020204" pitchFamily="34" charset="0"/>
+              </a:rPr>
+              <a:t>By </a:t>
+            </a:r>
+            <a:r>
+              <a:rPr lang="en-US" altLang="zh-CN" sz="5799" dirty="0" smtClean="0">
+                <a:cs typeface="Arial" panose="020B0604020202020204" pitchFamily="34" charset="0"/>
+              </a:rPr>
+              <a:t>adjusting your mouse</a:t>
+            </a:r>
+            <a:r>
+              <a:rPr lang="en-US" sz="5799" dirty="0" smtClean="0">
+                <a:cs typeface="Arial" panose="020B0604020202020204" pitchFamily="34" charset="0"/>
+              </a:rPr>
+              <a:t>, </a:t>
+            </a:r>
+            <a:r>
+              <a:rPr lang="en-US" sz="5799" b="1" dirty="0">
+                <a:cs typeface="Arial" panose="020B0604020202020204" pitchFamily="34" charset="0"/>
+              </a:rPr>
+              <a:t>you are asked to estimate </a:t>
+            </a:r>
+            <a:r>
+              <a:rPr lang="en-US" sz="5799" b="1" dirty="0" smtClean="0">
+                <a:cs typeface="Arial" panose="020B0604020202020204" pitchFamily="34" charset="0"/>
+              </a:rPr>
+              <a:t>the </a:t>
+            </a:r>
+            <a:r>
+              <a:rPr lang="en-US" sz="5799" b="1" dirty="0" smtClean="0">
                 <a:solidFill>
                   <a:srgbClr val="FF0000"/>
                 </a:solidFill>
-                <a:latin typeface="Arial" panose="020B0604020202020204" pitchFamily="34" charset="0"/>
-                <a:cs typeface="Arial" panose="020B0604020202020204" pitchFamily="34" charset="0"/>
-              </a:rPr>
-              <a:t>sequence</a:t>
-            </a:r>
-            <a:r>
-              <a:rPr lang="en-US" altLang="zh-CN" sz="5799" dirty="0">
-                <a:latin typeface="Arial" panose="020B0604020202020204" pitchFamily="34" charset="0"/>
-                <a:cs typeface="Arial" panose="020B0604020202020204" pitchFamily="34" charset="0"/>
-              </a:rPr>
-              <a:t> of faces you just saw. </a:t>
-            </a:r>
+                <a:cs typeface="Arial" panose="020B0604020202020204" pitchFamily="34" charset="0"/>
+              </a:rPr>
+              <a:t>average </a:t>
+            </a:r>
+            <a:r>
+              <a:rPr lang="en-US" sz="5799" b="1" dirty="0">
+                <a:solidFill>
+                  <a:srgbClr val="FF0000"/>
+                </a:solidFill>
+                <a:cs typeface="Arial" panose="020B0604020202020204" pitchFamily="34" charset="0"/>
+              </a:rPr>
+              <a:t>emotional response of the </a:t>
+            </a:r>
+            <a:r>
+              <a:rPr lang="en-US" sz="5799" b="1" dirty="0" smtClean="0">
+                <a:solidFill>
+                  <a:srgbClr val="FF0000"/>
+                </a:solidFill>
+                <a:cs typeface="Arial" panose="020B0604020202020204" pitchFamily="34" charset="0"/>
+              </a:rPr>
+              <a:t>face sequence </a:t>
+            </a:r>
+            <a:r>
+              <a:rPr lang="en-US" sz="5799" b="1" dirty="0">
+                <a:solidFill>
+                  <a:srgbClr val="FF0000"/>
+                </a:solidFill>
+                <a:cs typeface="Arial" panose="020B0604020202020204" pitchFamily="34" charset="0"/>
+              </a:rPr>
+              <a:t>you just saw. </a:t>
+            </a:r>
+            <a:br>
+              <a:rPr lang="en-US" sz="5799" b="1" dirty="0">
+                <a:solidFill>
+                  <a:srgbClr val="FF0000"/>
+                </a:solidFill>
+                <a:cs typeface="Arial" panose="020B0604020202020204" pitchFamily="34" charset="0"/>
+              </a:rPr>
+            </a:br>
+            <a:r>
+              <a:rPr lang="en-US" sz="5799" b="1" dirty="0">
+                <a:cs typeface="Arial" panose="020B0604020202020204" pitchFamily="34" charset="0"/>
+              </a:rPr>
+              <a:t/>
+            </a:r>
+            <a:br>
+              <a:rPr lang="en-US" sz="5799" b="1" dirty="0">
+                <a:cs typeface="Arial" panose="020B0604020202020204" pitchFamily="34" charset="0"/>
+              </a:rPr>
+            </a:br>
             <a:endParaRPr lang="en-US" sz="5799" dirty="0">
-              <a:latin typeface="Arial" panose="020B0604020202020204" pitchFamily="34" charset="0"/>
               <a:cs typeface="Arial" panose="020B0604020202020204" pitchFamily="34" charset="0"/>
             </a:endParaRPr>
           </a:p>
@@ -3899,7 +4087,7 @@
           <p:cNvPr id="4" name="Picture 3">
             <a:extLst>
               <a:ext uri="{FF2B5EF4-FFF2-40B4-BE49-F238E27FC236}">
-                <a16:creationId xmlns:a16="http://schemas.microsoft.com/office/drawing/2014/main" id="{53C2161E-9EEC-D04D-9753-DA9905FF4E72}"/>
+                <a16:creationId xmlns:a16="http://schemas.microsoft.com/office/drawing/2014/main" id="{4010F5EB-4DF2-42D0-9301-0EEBAFDE6E18}"/>
               </a:ext>
             </a:extLst>
           </p:cNvPr>
@@ -3916,8 +4104,8 @@
         </p:blipFill>
         <p:spPr>
           <a:xfrm>
-            <a:off x="580523" y="5640348"/>
-            <a:ext cx="22867968" cy="6858001"/>
+            <a:off x="10794119" y="6927678"/>
+            <a:ext cx="2795761" cy="3588884"/>
           </a:xfrm>
           <a:prstGeom prst="rect">
             <a:avLst/>
@@ -3927,7 +4115,7 @@
     </p:spTree>
     <p:extLst>
       <p:ext uri="{BB962C8B-B14F-4D97-AF65-F5344CB8AC3E}">
-        <p14:creationId xmlns:p14="http://schemas.microsoft.com/office/powerpoint/2010/main" val="1249271639"/>
+        <p14:creationId xmlns:p14="http://schemas.microsoft.com/office/powerpoint/2010/main" val="1787496859"/>
       </p:ext>
     </p:extLst>
   </p:cSld>
@@ -3964,213 +4152,10 @@
       </p:grpSpPr>
       <p:sp>
         <p:nvSpPr>
-          <p:cNvPr id="2" name="Title 1">
+          <p:cNvPr id="7" name="Title 1">
             <a:extLst>
               <a:ext uri="{FF2B5EF4-FFF2-40B4-BE49-F238E27FC236}">
-                <a16:creationId xmlns:a16="http://schemas.microsoft.com/office/drawing/2014/main" id="{21DCC761-EEA5-3B4F-AEC8-ED98BC41E974}"/>
-              </a:ext>
-            </a:extLst>
-          </p:cNvPr>
-          <p:cNvSpPr>
-            <a:spLocks noGrp="1"/>
-          </p:cNvSpPr>
-          <p:nvPr>
-            <p:ph type="ctrTitle"/>
-          </p:nvPr>
-        </p:nvSpPr>
-        <p:spPr>
-          <a:xfrm>
-            <a:off x="0" y="-276748"/>
-            <a:ext cx="23334350" cy="1484589"/>
-          </a:xfrm>
-        </p:spPr>
-        <p:txBody>
-          <a:bodyPr>
-            <a:noAutofit/>
-          </a:bodyPr>
-          <a:lstStyle/>
-          <a:p>
-            <a:pPr algn="l"/>
-            <a:br>
-              <a:rPr lang="en-US" altLang="zh-CN" sz="4000" dirty="0">
-                <a:latin typeface="Arial" panose="020B0604020202020204" pitchFamily="34" charset="0"/>
-                <a:cs typeface="Arial" panose="020B0604020202020204" pitchFamily="34" charset="0"/>
-              </a:rPr>
-            </a:br>
-            <a:r>
-              <a:rPr lang="en-US" altLang="zh-CN" sz="6400" dirty="0">
-                <a:latin typeface="Arial" panose="020B0604020202020204" pitchFamily="34" charset="0"/>
-                <a:cs typeface="Arial" panose="020B0604020202020204" pitchFamily="34" charset="0"/>
-              </a:rPr>
-              <a:t>Once</a:t>
-            </a:r>
-            <a:r>
-              <a:rPr lang="zh-CN" altLang="en-US" sz="6400" dirty="0">
-                <a:latin typeface="Arial" panose="020B0604020202020204" pitchFamily="34" charset="0"/>
-                <a:cs typeface="Arial" panose="020B0604020202020204" pitchFamily="34" charset="0"/>
-              </a:rPr>
-              <a:t> </a:t>
-            </a:r>
-            <a:r>
-              <a:rPr lang="en-US" altLang="zh-CN" sz="6400" dirty="0">
-                <a:latin typeface="Arial" panose="020B0604020202020204" pitchFamily="34" charset="0"/>
-                <a:cs typeface="Arial" panose="020B0604020202020204" pitchFamily="34" charset="0"/>
-              </a:rPr>
-              <a:t>you</a:t>
-            </a:r>
-            <a:r>
-              <a:rPr lang="zh-CN" altLang="en-US" sz="6400" dirty="0">
-                <a:latin typeface="Arial" panose="020B0604020202020204" pitchFamily="34" charset="0"/>
-                <a:cs typeface="Arial" panose="020B0604020202020204" pitchFamily="34" charset="0"/>
-              </a:rPr>
-              <a:t> </a:t>
-            </a:r>
-            <a:r>
-              <a:rPr lang="en-US" altLang="zh-CN" sz="6400" dirty="0">
-                <a:latin typeface="Arial" panose="020B0604020202020204" pitchFamily="34" charset="0"/>
-                <a:cs typeface="Arial" panose="020B0604020202020204" pitchFamily="34" charset="0"/>
-              </a:rPr>
-              <a:t>make</a:t>
-            </a:r>
-            <a:r>
-              <a:rPr lang="zh-CN" altLang="en-US" sz="6400" dirty="0">
-                <a:latin typeface="Arial" panose="020B0604020202020204" pitchFamily="34" charset="0"/>
-                <a:cs typeface="Arial" panose="020B0604020202020204" pitchFamily="34" charset="0"/>
-              </a:rPr>
-              <a:t> </a:t>
-            </a:r>
-            <a:r>
-              <a:rPr lang="en-US" altLang="zh-CN" sz="6400" dirty="0">
-                <a:latin typeface="Arial" panose="020B0604020202020204" pitchFamily="34" charset="0"/>
-                <a:cs typeface="Arial" panose="020B0604020202020204" pitchFamily="34" charset="0"/>
-              </a:rPr>
-              <a:t>the</a:t>
-            </a:r>
-            <a:r>
-              <a:rPr lang="zh-CN" altLang="en-US" sz="6400" dirty="0">
-                <a:latin typeface="Arial" panose="020B0604020202020204" pitchFamily="34" charset="0"/>
-                <a:cs typeface="Arial" panose="020B0604020202020204" pitchFamily="34" charset="0"/>
-              </a:rPr>
-              <a:t> </a:t>
-            </a:r>
-            <a:r>
-              <a:rPr lang="en-US" altLang="zh-CN" sz="6400" dirty="0">
-                <a:latin typeface="Arial" panose="020B0604020202020204" pitchFamily="34" charset="0"/>
-                <a:cs typeface="Arial" panose="020B0604020202020204" pitchFamily="34" charset="0"/>
-              </a:rPr>
-              <a:t>choice,</a:t>
-            </a:r>
-            <a:r>
-              <a:rPr lang="zh-CN" altLang="en-US" sz="6400" dirty="0">
-                <a:latin typeface="Arial" panose="020B0604020202020204" pitchFamily="34" charset="0"/>
-                <a:cs typeface="Arial" panose="020B0604020202020204" pitchFamily="34" charset="0"/>
-              </a:rPr>
-              <a:t> </a:t>
-            </a:r>
-            <a:r>
-              <a:rPr lang="en-US" altLang="zh-CN" sz="6400" dirty="0">
-                <a:latin typeface="Arial" panose="020B0604020202020204" pitchFamily="34" charset="0"/>
-                <a:cs typeface="Arial" panose="020B0604020202020204" pitchFamily="34" charset="0"/>
-              </a:rPr>
-              <a:t>the</a:t>
-            </a:r>
-            <a:r>
-              <a:rPr lang="zh-CN" altLang="en-US" sz="6400" dirty="0">
-                <a:latin typeface="Arial" panose="020B0604020202020204" pitchFamily="34" charset="0"/>
-                <a:cs typeface="Arial" panose="020B0604020202020204" pitchFamily="34" charset="0"/>
-              </a:rPr>
-              <a:t> </a:t>
-            </a:r>
-            <a:r>
-              <a:rPr lang="en-US" altLang="zh-CN" sz="6400" dirty="0">
-                <a:latin typeface="Arial" panose="020B0604020202020204" pitchFamily="34" charset="0"/>
-                <a:cs typeface="Arial" panose="020B0604020202020204" pitchFamily="34" charset="0"/>
-              </a:rPr>
-              <a:t>page</a:t>
-            </a:r>
-            <a:r>
-              <a:rPr lang="zh-CN" altLang="en-US" sz="6400" dirty="0">
-                <a:latin typeface="Arial" panose="020B0604020202020204" pitchFamily="34" charset="0"/>
-                <a:cs typeface="Arial" panose="020B0604020202020204" pitchFamily="34" charset="0"/>
-              </a:rPr>
-              <a:t> </a:t>
-            </a:r>
-            <a:r>
-              <a:rPr lang="en-US" altLang="zh-CN" sz="6400" dirty="0">
-                <a:latin typeface="Arial" panose="020B0604020202020204" pitchFamily="34" charset="0"/>
-                <a:cs typeface="Arial" panose="020B0604020202020204" pitchFamily="34" charset="0"/>
-              </a:rPr>
-              <a:t>will</a:t>
-            </a:r>
-            <a:r>
-              <a:rPr lang="zh-CN" altLang="en-US" sz="6400" dirty="0">
-                <a:latin typeface="Arial" panose="020B0604020202020204" pitchFamily="34" charset="0"/>
-                <a:cs typeface="Arial" panose="020B0604020202020204" pitchFamily="34" charset="0"/>
-              </a:rPr>
-              <a:t> </a:t>
-            </a:r>
-            <a:r>
-              <a:rPr lang="en-US" altLang="zh-CN" sz="6400" dirty="0">
-                <a:latin typeface="Arial" panose="020B0604020202020204" pitchFamily="34" charset="0"/>
-                <a:cs typeface="Arial" panose="020B0604020202020204" pitchFamily="34" charset="0"/>
-              </a:rPr>
-              <a:t>switch</a:t>
-            </a:r>
-            <a:r>
-              <a:rPr lang="zh-CN" altLang="en-US" sz="6400" dirty="0">
-                <a:latin typeface="Arial" panose="020B0604020202020204" pitchFamily="34" charset="0"/>
-                <a:cs typeface="Arial" panose="020B0604020202020204" pitchFamily="34" charset="0"/>
-              </a:rPr>
-              <a:t> </a:t>
-            </a:r>
-            <a:r>
-              <a:rPr lang="en-US" altLang="zh-CN" sz="6400" dirty="0">
-                <a:latin typeface="Arial" panose="020B0604020202020204" pitchFamily="34" charset="0"/>
-                <a:cs typeface="Arial" panose="020B0604020202020204" pitchFamily="34" charset="0"/>
-              </a:rPr>
-              <a:t>to the</a:t>
-            </a:r>
-            <a:r>
-              <a:rPr lang="zh-CN" altLang="en-US" sz="6400" dirty="0">
-                <a:latin typeface="Arial" panose="020B0604020202020204" pitchFamily="34" charset="0"/>
-                <a:cs typeface="Arial" panose="020B0604020202020204" pitchFamily="34" charset="0"/>
-              </a:rPr>
-              <a:t> </a:t>
-            </a:r>
-            <a:r>
-              <a:rPr lang="en-US" altLang="zh-CN" sz="6400" dirty="0">
-                <a:latin typeface="Arial" panose="020B0604020202020204" pitchFamily="34" charset="0"/>
-                <a:cs typeface="Arial" panose="020B0604020202020204" pitchFamily="34" charset="0"/>
-              </a:rPr>
-              <a:t>next</a:t>
-            </a:r>
-            <a:r>
-              <a:rPr lang="zh-CN" altLang="en-US" sz="6400" dirty="0">
-                <a:latin typeface="Arial" panose="020B0604020202020204" pitchFamily="34" charset="0"/>
-                <a:cs typeface="Arial" panose="020B0604020202020204" pitchFamily="34" charset="0"/>
-              </a:rPr>
-              <a:t> </a:t>
-            </a:r>
-            <a:r>
-              <a:rPr lang="en-US" altLang="zh-CN" sz="6400" dirty="0">
-                <a:latin typeface="Arial" panose="020B0604020202020204" pitchFamily="34" charset="0"/>
-                <a:cs typeface="Arial" panose="020B0604020202020204" pitchFamily="34" charset="0"/>
-              </a:rPr>
-              <a:t>trial.</a:t>
-            </a:r>
-            <a:endParaRPr lang="en-US" sz="4000" dirty="0">
-              <a:latin typeface="Arial" panose="020B0604020202020204" pitchFamily="34" charset="0"/>
-              <a:cs typeface="Arial" panose="020B0604020202020204" pitchFamily="34" charset="0"/>
-            </a:endParaRPr>
-          </a:p>
-        </p:txBody>
-      </p:sp>
-      <p:sp>
-        <p:nvSpPr>
-          <p:cNvPr id="10" name="Subtitle 2">
-            <a:extLst>
-              <a:ext uri="{FF2B5EF4-FFF2-40B4-BE49-F238E27FC236}">
-                <a16:creationId xmlns:a16="http://schemas.microsoft.com/office/drawing/2014/main" id="{7B657E54-FB0B-9846-9D3A-5F4CAB62197F}"/>
+                <a16:creationId xmlns:a16="http://schemas.microsoft.com/office/drawing/2014/main" id="{AC1207DB-B1B9-2640-A8F7-AF32188774C8}"/>
               </a:ext>
             </a:extLst>
           </p:cNvPr>
@@ -4181,300 +4166,166 @@
         </p:nvSpPr>
         <p:spPr>
           <a:xfrm>
-            <a:off x="6379134" y="10910125"/>
-            <a:ext cx="10163955" cy="2539913"/>
+            <a:off x="580523" y="3873175"/>
+            <a:ext cx="24297778" cy="1783502"/>
           </a:xfrm>
           <a:prstGeom prst="rect">
             <a:avLst/>
           </a:prstGeom>
         </p:spPr>
         <p:txBody>
-          <a:bodyPr vert="horz" lIns="182856" tIns="91428" rIns="182856" bIns="91428" rtlCol="0">
-            <a:normAutofit/>
+          <a:bodyPr vert="horz" lIns="182856" tIns="91428" rIns="182856" bIns="91428" rtlCol="0" anchor="b">
+            <a:noAutofit/>
           </a:bodyPr>
           <a:lstStyle>
-            <a:lvl1pPr marL="0" indent="0" algn="l" defTabSz="914400" rtl="0" eaLnBrk="1" latinLnBrk="0" hangingPunct="1">
+            <a:lvl1pPr algn="ctr" defTabSz="914400" rtl="0" eaLnBrk="1" latinLnBrk="0" hangingPunct="1">
               <a:lnSpc>
                 <a:spcPct val="90000"/>
               </a:lnSpc>
               <a:spcBef>
-                <a:spcPts val="1200"/>
+                <a:spcPct val="0"/>
               </a:spcBef>
-              <a:buClr>
-                <a:schemeClr val="accent1">
-                  <a:lumMod val="75000"/>
-                </a:schemeClr>
-              </a:buClr>
-              <a:buSzPct val="85000"/>
-              <a:buFont typeface="Wingdings" pitchFamily="2" charset="2"/>
-              <a:buNone/>
-              <a:defRPr sz="2200" kern="1200">
+              <a:buNone/>
+              <a:defRPr sz="6000" kern="1200">
                 <a:solidFill>
                   <a:schemeClr val="tx1"/>
                 </a:solidFill>
-                <a:latin typeface="+mn-lt"/>
-                <a:ea typeface="+mn-ea"/>
-                <a:cs typeface="+mn-cs"/>
+                <a:latin typeface="+mj-lt"/>
+                <a:ea typeface="+mj-ea"/>
+                <a:cs typeface="+mj-cs"/>
               </a:defRPr>
             </a:lvl1pPr>
-            <a:lvl2pPr marL="457200" indent="0" algn="ctr" defTabSz="914400" rtl="0" eaLnBrk="1" latinLnBrk="0" hangingPunct="1">
-              <a:lnSpc>
-                <a:spcPct val="90000"/>
-              </a:lnSpc>
-              <a:spcBef>
-                <a:spcPts val="400"/>
-              </a:spcBef>
-              <a:spcAft>
-                <a:spcPts val="200"/>
-              </a:spcAft>
-              <a:buClr>
-                <a:schemeClr val="accent1">
-                  <a:lumMod val="75000"/>
-                </a:schemeClr>
-              </a:buClr>
-              <a:buSzPct val="85000"/>
-              <a:buFont typeface="Wingdings" pitchFamily="2" charset="2"/>
-              <a:buNone/>
-              <a:defRPr sz="2800" kern="1200">
+          </a:lstStyle>
+          <a:p>
+            <a:r>
+              <a:rPr lang="en-US" altLang="zh-CN" sz="5799" dirty="0">
+                <a:latin typeface="Arial" panose="020B0604020202020204" pitchFamily="34" charset="0"/>
+                <a:cs typeface="Arial" panose="020B0604020202020204" pitchFamily="34" charset="0"/>
+              </a:rPr>
+              <a:t/>
+            </a:r>
+            <a:br>
+              <a:rPr lang="en-US" altLang="zh-CN" sz="5799" dirty="0">
+                <a:latin typeface="Arial" panose="020B0604020202020204" pitchFamily="34" charset="0"/>
+                <a:cs typeface="Arial" panose="020B0604020202020204" pitchFamily="34" charset="0"/>
+              </a:rPr>
+            </a:br>
+            <a:r>
+              <a:rPr lang="en-US" altLang="zh-CN" sz="5799" dirty="0">
+                <a:latin typeface="Arial" panose="020B0604020202020204" pitchFamily="34" charset="0"/>
+                <a:cs typeface="Arial" panose="020B0604020202020204" pitchFamily="34" charset="0"/>
+              </a:rPr>
+              <a:t>Remember, the goal here is provide </a:t>
+            </a:r>
+          </a:p>
+          <a:p>
+            <a:endParaRPr lang="en-US" altLang="zh-CN" sz="2000" dirty="0">
+              <a:latin typeface="Arial" panose="020B0604020202020204" pitchFamily="34" charset="0"/>
+              <a:cs typeface="Arial" panose="020B0604020202020204" pitchFamily="34" charset="0"/>
+            </a:endParaRPr>
+          </a:p>
+          <a:p>
+            <a:r>
+              <a:rPr lang="en-US" altLang="zh-CN" sz="5799" dirty="0">
+                <a:latin typeface="Arial" panose="020B0604020202020204" pitchFamily="34" charset="0"/>
+                <a:cs typeface="Arial" panose="020B0604020202020204" pitchFamily="34" charset="0"/>
+              </a:rPr>
+              <a:t>YOUR ESTIMATION OF </a:t>
+            </a:r>
+            <a:r>
+              <a:rPr lang="en-US" altLang="zh-CN" sz="5799" dirty="0" smtClean="0">
+                <a:latin typeface="Arial" panose="020B0604020202020204" pitchFamily="34" charset="0"/>
+                <a:cs typeface="Arial" panose="020B0604020202020204" pitchFamily="34" charset="0"/>
+              </a:rPr>
+              <a:t>THE </a:t>
+            </a:r>
+          </a:p>
+          <a:p>
+            <a:r>
+              <a:rPr lang="en-US" altLang="zh-CN" sz="5799" dirty="0" smtClean="0">
                 <a:solidFill>
-                  <a:schemeClr val="tx1"/>
+                  <a:srgbClr val="FF0000"/>
                 </a:solidFill>
-                <a:latin typeface="+mn-lt"/>
-                <a:ea typeface="+mn-ea"/>
-                <a:cs typeface="+mn-cs"/>
-              </a:defRPr>
-            </a:lvl2pPr>
-            <a:lvl3pPr marL="914400" indent="0" algn="ctr" defTabSz="914400" rtl="0" eaLnBrk="1" latinLnBrk="0" hangingPunct="1">
-              <a:lnSpc>
-                <a:spcPct val="90000"/>
-              </a:lnSpc>
-              <a:spcBef>
-                <a:spcPts val="400"/>
-              </a:spcBef>
-              <a:spcAft>
-                <a:spcPts val="200"/>
-              </a:spcAft>
-              <a:buClr>
-                <a:schemeClr val="accent1">
-                  <a:lumMod val="75000"/>
-                </a:schemeClr>
-              </a:buClr>
-              <a:buSzPct val="85000"/>
-              <a:buFont typeface="Wingdings" pitchFamily="2" charset="2"/>
-              <a:buNone/>
-              <a:defRPr sz="2400" kern="1200">
+                <a:latin typeface="Arial" panose="020B0604020202020204" pitchFamily="34" charset="0"/>
+                <a:cs typeface="Arial" panose="020B0604020202020204" pitchFamily="34" charset="0"/>
+              </a:rPr>
+              <a:t>AVERAGE</a:t>
+            </a:r>
+            <a:r>
+              <a:rPr lang="en-US" altLang="zh-CN" sz="5799" dirty="0">
                 <a:solidFill>
-                  <a:schemeClr val="tx1"/>
+                  <a:srgbClr val="FF0000"/>
                 </a:solidFill>
-                <a:latin typeface="+mn-lt"/>
-                <a:ea typeface="+mn-ea"/>
-                <a:cs typeface="+mn-cs"/>
-              </a:defRPr>
-            </a:lvl3pPr>
-            <a:lvl4pPr marL="1371600" indent="0" algn="ctr" defTabSz="914400" rtl="0" eaLnBrk="1" latinLnBrk="0" hangingPunct="1">
-              <a:lnSpc>
-                <a:spcPct val="90000"/>
-              </a:lnSpc>
-              <a:spcBef>
-                <a:spcPts val="400"/>
-              </a:spcBef>
-              <a:spcAft>
-                <a:spcPts val="200"/>
-              </a:spcAft>
-              <a:buClr>
-                <a:schemeClr val="accent1">
-                  <a:lumMod val="75000"/>
-                </a:schemeClr>
-              </a:buClr>
-              <a:buSzPct val="85000"/>
-              <a:buFont typeface="Wingdings" pitchFamily="2" charset="2"/>
-              <a:buNone/>
-              <a:defRPr sz="2000" kern="1200">
+                <a:latin typeface="Arial" panose="020B0604020202020204" pitchFamily="34" charset="0"/>
+                <a:cs typeface="Arial" panose="020B0604020202020204" pitchFamily="34" charset="0"/>
+              </a:rPr>
+              <a:t> EMOTIONAL </a:t>
+            </a:r>
+            <a:r>
+              <a:rPr lang="en-US" altLang="zh-CN" sz="5799" dirty="0" smtClean="0">
                 <a:solidFill>
-                  <a:schemeClr val="tx1"/>
+                  <a:srgbClr val="FF0000"/>
                 </a:solidFill>
-                <a:latin typeface="+mn-lt"/>
-                <a:ea typeface="+mn-ea"/>
-                <a:cs typeface="+mn-cs"/>
-              </a:defRPr>
-            </a:lvl4pPr>
-            <a:lvl5pPr marL="1828800" indent="0" algn="ctr" defTabSz="914400" rtl="0" eaLnBrk="1" latinLnBrk="0" hangingPunct="1">
-              <a:lnSpc>
-                <a:spcPct val="90000"/>
-              </a:lnSpc>
-              <a:spcBef>
-                <a:spcPts val="400"/>
-              </a:spcBef>
-              <a:spcAft>
-                <a:spcPts val="200"/>
-              </a:spcAft>
-              <a:buClr>
-                <a:schemeClr val="accent1">
-                  <a:lumMod val="75000"/>
-                </a:schemeClr>
-              </a:buClr>
-              <a:buSzPct val="85000"/>
-              <a:buFont typeface="Wingdings" pitchFamily="2" charset="2"/>
-              <a:buNone/>
-              <a:defRPr sz="2000" kern="1200">
-                <a:solidFill>
-                  <a:schemeClr val="tx1"/>
-                </a:solidFill>
-                <a:latin typeface="+mn-lt"/>
-                <a:ea typeface="+mn-ea"/>
-                <a:cs typeface="+mn-cs"/>
-              </a:defRPr>
-            </a:lvl5pPr>
-            <a:lvl6pPr marL="2286000" indent="0" algn="ctr" defTabSz="914400" rtl="0" eaLnBrk="1" latinLnBrk="0" hangingPunct="1">
-              <a:lnSpc>
-                <a:spcPct val="90000"/>
-              </a:lnSpc>
-              <a:spcBef>
-                <a:spcPts val="400"/>
-              </a:spcBef>
-              <a:spcAft>
-                <a:spcPts val="200"/>
-              </a:spcAft>
-              <a:buClr>
-                <a:schemeClr val="accent1">
-                  <a:lumMod val="75000"/>
-                </a:schemeClr>
-              </a:buClr>
-              <a:buSzPct val="85000"/>
-              <a:buFont typeface="Wingdings" pitchFamily="2" charset="2"/>
-              <a:buNone/>
-              <a:defRPr sz="2000" kern="1200">
-                <a:solidFill>
-                  <a:schemeClr val="tx1"/>
-                </a:solidFill>
-                <a:latin typeface="+mn-lt"/>
-                <a:ea typeface="+mn-ea"/>
-                <a:cs typeface="+mn-cs"/>
-              </a:defRPr>
-            </a:lvl6pPr>
-            <a:lvl7pPr marL="2743200" indent="0" algn="ctr" defTabSz="914400" rtl="0" eaLnBrk="1" latinLnBrk="0" hangingPunct="1">
-              <a:lnSpc>
-                <a:spcPct val="90000"/>
-              </a:lnSpc>
-              <a:spcBef>
-                <a:spcPts val="400"/>
-              </a:spcBef>
-              <a:spcAft>
-                <a:spcPts val="200"/>
-              </a:spcAft>
-              <a:buClr>
-                <a:schemeClr val="accent1">
-                  <a:lumMod val="75000"/>
-                </a:schemeClr>
-              </a:buClr>
-              <a:buSzPct val="85000"/>
-              <a:buFont typeface="Wingdings" pitchFamily="2" charset="2"/>
-              <a:buNone/>
-              <a:defRPr sz="2000" kern="1200">
-                <a:solidFill>
-                  <a:schemeClr val="tx1"/>
-                </a:solidFill>
-                <a:latin typeface="+mn-lt"/>
-                <a:ea typeface="+mn-ea"/>
-                <a:cs typeface="+mn-cs"/>
-              </a:defRPr>
-            </a:lvl7pPr>
-            <a:lvl8pPr marL="3200400" indent="0" algn="ctr" defTabSz="914400" rtl="0" eaLnBrk="1" latinLnBrk="0" hangingPunct="1">
-              <a:lnSpc>
-                <a:spcPct val="90000"/>
-              </a:lnSpc>
-              <a:spcBef>
-                <a:spcPts val="400"/>
-              </a:spcBef>
-              <a:spcAft>
-                <a:spcPts val="200"/>
-              </a:spcAft>
-              <a:buClr>
-                <a:schemeClr val="accent1">
-                  <a:lumMod val="75000"/>
-                </a:schemeClr>
-              </a:buClr>
-              <a:buSzPct val="85000"/>
-              <a:buFont typeface="Wingdings" pitchFamily="2" charset="2"/>
-              <a:buNone/>
-              <a:defRPr sz="2000" kern="1200">
-                <a:solidFill>
-                  <a:schemeClr val="tx1"/>
-                </a:solidFill>
-                <a:latin typeface="+mn-lt"/>
-                <a:ea typeface="+mn-ea"/>
-                <a:cs typeface="+mn-cs"/>
-              </a:defRPr>
-            </a:lvl8pPr>
-            <a:lvl9pPr marL="3657600" indent="0" algn="ctr" defTabSz="914400" rtl="0" eaLnBrk="1" latinLnBrk="0" hangingPunct="1">
-              <a:lnSpc>
-                <a:spcPct val="90000"/>
-              </a:lnSpc>
-              <a:spcBef>
-                <a:spcPts val="400"/>
-              </a:spcBef>
-              <a:spcAft>
-                <a:spcPts val="200"/>
-              </a:spcAft>
-              <a:buClr>
-                <a:schemeClr val="accent1">
-                  <a:lumMod val="75000"/>
-                </a:schemeClr>
-              </a:buClr>
-              <a:buSzPct val="85000"/>
-              <a:buFont typeface="Wingdings" pitchFamily="2" charset="2"/>
-              <a:buNone/>
-              <a:defRPr sz="2000" kern="1200">
-                <a:solidFill>
-                  <a:schemeClr val="tx1"/>
-                </a:solidFill>
-                <a:latin typeface="+mn-lt"/>
-                <a:ea typeface="+mn-ea"/>
-                <a:cs typeface="+mn-cs"/>
-              </a:defRPr>
-            </a:lvl9pPr>
-          </a:lstStyle>
-          <a:p>
-            <a:endParaRPr lang="en-US" sz="4000" dirty="0">
+                <a:latin typeface="Arial" panose="020B0604020202020204" pitchFamily="34" charset="0"/>
+                <a:cs typeface="Arial" panose="020B0604020202020204" pitchFamily="34" charset="0"/>
+              </a:rPr>
+              <a:t>RESPONSE</a:t>
+            </a:r>
+            <a:r>
+              <a:rPr lang="en-US" altLang="zh-CN" sz="5799" dirty="0" smtClean="0">
+                <a:latin typeface="Arial" panose="020B0604020202020204" pitchFamily="34" charset="0"/>
+                <a:cs typeface="Arial" panose="020B0604020202020204" pitchFamily="34" charset="0"/>
+              </a:rPr>
+              <a:t> </a:t>
+            </a:r>
+            <a:r>
+              <a:rPr lang="en-US" altLang="zh-CN" sz="2000" dirty="0" smtClean="0">
+                <a:latin typeface="Arial" panose="020B0604020202020204" pitchFamily="34" charset="0"/>
+                <a:cs typeface="Arial" panose="020B0604020202020204" pitchFamily="34" charset="0"/>
+              </a:rPr>
+              <a:t> </a:t>
+            </a:r>
+            <a:r>
+              <a:rPr lang="en-US" altLang="zh-CN" sz="2000" dirty="0">
+                <a:latin typeface="Arial" panose="020B0604020202020204" pitchFamily="34" charset="0"/>
+                <a:cs typeface="Arial" panose="020B0604020202020204" pitchFamily="34" charset="0"/>
+              </a:rPr>
+              <a:t> </a:t>
+            </a:r>
+          </a:p>
+          <a:p>
+            <a:r>
+              <a:rPr lang="en-US" altLang="zh-CN" sz="5799" dirty="0">
+                <a:latin typeface="Arial" panose="020B0604020202020204" pitchFamily="34" charset="0"/>
+                <a:cs typeface="Arial" panose="020B0604020202020204" pitchFamily="34" charset="0"/>
+              </a:rPr>
+              <a:t>of the </a:t>
+            </a:r>
+            <a:r>
+              <a:rPr lang="en-US" altLang="zh-CN" sz="5799" dirty="0" smtClean="0">
+                <a:latin typeface="Arial" panose="020B0604020202020204" pitchFamily="34" charset="0"/>
+                <a:cs typeface="Arial" panose="020B0604020202020204" pitchFamily="34" charset="0"/>
+              </a:rPr>
+              <a:t>face sequence </a:t>
+            </a:r>
+            <a:r>
+              <a:rPr lang="en-US" altLang="zh-CN" sz="5799" dirty="0">
+                <a:latin typeface="Arial" panose="020B0604020202020204" pitchFamily="34" charset="0"/>
+                <a:cs typeface="Arial" panose="020B0604020202020204" pitchFamily="34" charset="0"/>
+              </a:rPr>
+              <a:t>you just saw. </a:t>
+            </a:r>
+            <a:endParaRPr lang="en-US" sz="5799" dirty="0">
               <a:latin typeface="Arial" panose="020B0604020202020204" pitchFamily="34" charset="0"/>
+              <a:cs typeface="Arial" panose="020B0604020202020204" pitchFamily="34" charset="0"/>
             </a:endParaRPr>
           </a:p>
         </p:txBody>
       </p:sp>
-      <p:pic>
-        <p:nvPicPr>
-          <p:cNvPr id="7" name="Picture 6">
-            <a:extLst>
-              <a:ext uri="{FF2B5EF4-FFF2-40B4-BE49-F238E27FC236}">
-                <a16:creationId xmlns:a16="http://schemas.microsoft.com/office/drawing/2014/main" id="{BF1500CA-DCCC-46AE-9BB0-11CC314783AC}"/>
-              </a:ext>
-            </a:extLst>
-          </p:cNvPr>
-          <p:cNvPicPr>
-            <a:picLocks noChangeAspect="1"/>
-          </p:cNvPicPr>
-          <p:nvPr/>
-        </p:nvPicPr>
-        <p:blipFill>
-          <a:blip r:embed="rId2"/>
-          <a:stretch>
-            <a:fillRect/>
-          </a:stretch>
-        </p:blipFill>
-        <p:spPr>
-          <a:xfrm>
-            <a:off x="10269294" y="4559075"/>
-            <a:ext cx="2795761" cy="3588884"/>
-          </a:xfrm>
-          <a:prstGeom prst="rect">
-            <a:avLst/>
-          </a:prstGeom>
-        </p:spPr>
-      </p:pic>
     </p:spTree>
     <p:extLst>
       <p:ext uri="{BB962C8B-B14F-4D97-AF65-F5344CB8AC3E}">
-        <p14:creationId xmlns:p14="http://schemas.microsoft.com/office/powerpoint/2010/main" val="999307571"/>
+        <p14:creationId xmlns:p14="http://schemas.microsoft.com/office/powerpoint/2010/main" val="1249271639"/>
       </p:ext>
     </p:extLst>
   </p:cSld>
@@ -4511,84 +4362,486 @@
       </p:grpSpPr>
       <p:sp>
         <p:nvSpPr>
-          <p:cNvPr id="4" name="Rectangle 3">
+          <p:cNvPr id="2" name="Title 1">
             <a:extLst>
               <a:ext uri="{FF2B5EF4-FFF2-40B4-BE49-F238E27FC236}">
-                <a16:creationId xmlns:a16="http://schemas.microsoft.com/office/drawing/2014/main" id="{8E3B8A65-8FC9-41F2-998D-6A0E4DAA3B8F}"/>
+                <a16:creationId xmlns:a16="http://schemas.microsoft.com/office/drawing/2014/main" id="{21DCC761-EEA5-3B4F-AEC8-ED98BC41E974}"/>
               </a:ext>
             </a:extLst>
           </p:cNvPr>
-          <p:cNvSpPr/>
-          <p:nvPr/>
+          <p:cNvSpPr>
+            <a:spLocks noGrp="1"/>
+          </p:cNvSpPr>
+          <p:nvPr>
+            <p:ph type="ctrTitle"/>
+          </p:nvPr>
         </p:nvSpPr>
         <p:spPr>
           <a:xfrm>
-            <a:off x="749150" y="2090049"/>
-            <a:ext cx="22880871" cy="7478766"/>
+            <a:off x="1049650" y="2435698"/>
+            <a:ext cx="23334350" cy="1484589"/>
+          </a:xfrm>
+        </p:spPr>
+        <p:txBody>
+          <a:bodyPr>
+            <a:noAutofit/>
+          </a:bodyPr>
+          <a:lstStyle/>
+          <a:p>
+            <a:pPr algn="l"/>
+            <a:r>
+              <a:rPr lang="en-US" altLang="zh-CN" sz="4000" dirty="0">
+                <a:latin typeface="Arial" panose="020B0604020202020204" pitchFamily="34" charset="0"/>
+                <a:cs typeface="Arial" panose="020B0604020202020204" pitchFamily="34" charset="0"/>
+              </a:rPr>
+              <a:t/>
+            </a:r>
+            <a:br>
+              <a:rPr lang="en-US" altLang="zh-CN" sz="4000" dirty="0">
+                <a:latin typeface="Arial" panose="020B0604020202020204" pitchFamily="34" charset="0"/>
+                <a:cs typeface="Arial" panose="020B0604020202020204" pitchFamily="34" charset="0"/>
+              </a:rPr>
+            </a:br>
+            <a:r>
+              <a:rPr lang="en-US" altLang="zh-CN" sz="6400" dirty="0">
+                <a:latin typeface="Arial" panose="020B0604020202020204" pitchFamily="34" charset="0"/>
+                <a:cs typeface="Arial" panose="020B0604020202020204" pitchFamily="34" charset="0"/>
+              </a:rPr>
+              <a:t>Once</a:t>
+            </a:r>
+            <a:r>
+              <a:rPr lang="zh-CN" altLang="en-US" sz="6400" dirty="0">
+                <a:latin typeface="Arial" panose="020B0604020202020204" pitchFamily="34" charset="0"/>
+                <a:cs typeface="Arial" panose="020B0604020202020204" pitchFamily="34" charset="0"/>
+              </a:rPr>
+              <a:t> </a:t>
+            </a:r>
+            <a:r>
+              <a:rPr lang="en-US" altLang="zh-CN" sz="6400" dirty="0">
+                <a:latin typeface="Arial" panose="020B0604020202020204" pitchFamily="34" charset="0"/>
+                <a:cs typeface="Arial" panose="020B0604020202020204" pitchFamily="34" charset="0"/>
+              </a:rPr>
+              <a:t>you</a:t>
+            </a:r>
+            <a:r>
+              <a:rPr lang="zh-CN" altLang="en-US" sz="6400" dirty="0">
+                <a:latin typeface="Arial" panose="020B0604020202020204" pitchFamily="34" charset="0"/>
+                <a:cs typeface="Arial" panose="020B0604020202020204" pitchFamily="34" charset="0"/>
+              </a:rPr>
+              <a:t> </a:t>
+            </a:r>
+            <a:r>
+              <a:rPr lang="en-US" altLang="zh-CN" sz="6400" dirty="0">
+                <a:latin typeface="Arial" panose="020B0604020202020204" pitchFamily="34" charset="0"/>
+                <a:cs typeface="Arial" panose="020B0604020202020204" pitchFamily="34" charset="0"/>
+              </a:rPr>
+              <a:t>make</a:t>
+            </a:r>
+            <a:r>
+              <a:rPr lang="zh-CN" altLang="en-US" sz="6400" dirty="0">
+                <a:latin typeface="Arial" panose="020B0604020202020204" pitchFamily="34" charset="0"/>
+                <a:cs typeface="Arial" panose="020B0604020202020204" pitchFamily="34" charset="0"/>
+              </a:rPr>
+              <a:t> </a:t>
+            </a:r>
+            <a:r>
+              <a:rPr lang="en-US" altLang="zh-CN" sz="6400" dirty="0">
+                <a:latin typeface="Arial" panose="020B0604020202020204" pitchFamily="34" charset="0"/>
+                <a:cs typeface="Arial" panose="020B0604020202020204" pitchFamily="34" charset="0"/>
+              </a:rPr>
+              <a:t>the</a:t>
+            </a:r>
+            <a:r>
+              <a:rPr lang="zh-CN" altLang="en-US" sz="6400" dirty="0">
+                <a:latin typeface="Arial" panose="020B0604020202020204" pitchFamily="34" charset="0"/>
+                <a:cs typeface="Arial" panose="020B0604020202020204" pitchFamily="34" charset="0"/>
+              </a:rPr>
+              <a:t> </a:t>
+            </a:r>
+            <a:r>
+              <a:rPr lang="en-US" altLang="zh-CN" sz="6400" dirty="0">
+                <a:latin typeface="Arial" panose="020B0604020202020204" pitchFamily="34" charset="0"/>
+                <a:cs typeface="Arial" panose="020B0604020202020204" pitchFamily="34" charset="0"/>
+              </a:rPr>
+              <a:t>choice,</a:t>
+            </a:r>
+            <a:r>
+              <a:rPr lang="zh-CN" altLang="en-US" sz="6400" dirty="0">
+                <a:latin typeface="Arial" panose="020B0604020202020204" pitchFamily="34" charset="0"/>
+                <a:cs typeface="Arial" panose="020B0604020202020204" pitchFamily="34" charset="0"/>
+              </a:rPr>
+              <a:t> </a:t>
+            </a:r>
+            <a:r>
+              <a:rPr lang="en-US" altLang="zh-CN" sz="6400" dirty="0">
+                <a:latin typeface="Arial" panose="020B0604020202020204" pitchFamily="34" charset="0"/>
+                <a:cs typeface="Arial" panose="020B0604020202020204" pitchFamily="34" charset="0"/>
+              </a:rPr>
+              <a:t>the</a:t>
+            </a:r>
+            <a:r>
+              <a:rPr lang="zh-CN" altLang="en-US" sz="6400" dirty="0">
+                <a:latin typeface="Arial" panose="020B0604020202020204" pitchFamily="34" charset="0"/>
+                <a:cs typeface="Arial" panose="020B0604020202020204" pitchFamily="34" charset="0"/>
+              </a:rPr>
+              <a:t> </a:t>
+            </a:r>
+            <a:r>
+              <a:rPr lang="en-US" altLang="zh-CN" sz="6400" dirty="0">
+                <a:latin typeface="Arial" panose="020B0604020202020204" pitchFamily="34" charset="0"/>
+                <a:cs typeface="Arial" panose="020B0604020202020204" pitchFamily="34" charset="0"/>
+              </a:rPr>
+              <a:t>page</a:t>
+            </a:r>
+            <a:r>
+              <a:rPr lang="zh-CN" altLang="en-US" sz="6400" dirty="0">
+                <a:latin typeface="Arial" panose="020B0604020202020204" pitchFamily="34" charset="0"/>
+                <a:cs typeface="Arial" panose="020B0604020202020204" pitchFamily="34" charset="0"/>
+              </a:rPr>
+              <a:t> </a:t>
+            </a:r>
+            <a:r>
+              <a:rPr lang="en-US" altLang="zh-CN" sz="6400" dirty="0">
+                <a:latin typeface="Arial" panose="020B0604020202020204" pitchFamily="34" charset="0"/>
+                <a:cs typeface="Arial" panose="020B0604020202020204" pitchFamily="34" charset="0"/>
+              </a:rPr>
+              <a:t>will</a:t>
+            </a:r>
+            <a:r>
+              <a:rPr lang="zh-CN" altLang="en-US" sz="6400" dirty="0">
+                <a:latin typeface="Arial" panose="020B0604020202020204" pitchFamily="34" charset="0"/>
+                <a:cs typeface="Arial" panose="020B0604020202020204" pitchFamily="34" charset="0"/>
+              </a:rPr>
+              <a:t> </a:t>
+            </a:r>
+            <a:r>
+              <a:rPr lang="en-US" altLang="zh-CN" sz="6400" dirty="0">
+                <a:latin typeface="Arial" panose="020B0604020202020204" pitchFamily="34" charset="0"/>
+                <a:cs typeface="Arial" panose="020B0604020202020204" pitchFamily="34" charset="0"/>
+              </a:rPr>
+              <a:t>switch</a:t>
+            </a:r>
+            <a:r>
+              <a:rPr lang="zh-CN" altLang="en-US" sz="6400" dirty="0">
+                <a:latin typeface="Arial" panose="020B0604020202020204" pitchFamily="34" charset="0"/>
+                <a:cs typeface="Arial" panose="020B0604020202020204" pitchFamily="34" charset="0"/>
+              </a:rPr>
+              <a:t> </a:t>
+            </a:r>
+            <a:r>
+              <a:rPr lang="en-US" altLang="zh-CN" sz="6400" dirty="0">
+                <a:latin typeface="Arial" panose="020B0604020202020204" pitchFamily="34" charset="0"/>
+                <a:cs typeface="Arial" panose="020B0604020202020204" pitchFamily="34" charset="0"/>
+              </a:rPr>
+              <a:t>to the</a:t>
+            </a:r>
+            <a:r>
+              <a:rPr lang="zh-CN" altLang="en-US" sz="6400" dirty="0">
+                <a:latin typeface="Arial" panose="020B0604020202020204" pitchFamily="34" charset="0"/>
+                <a:cs typeface="Arial" panose="020B0604020202020204" pitchFamily="34" charset="0"/>
+              </a:rPr>
+              <a:t> </a:t>
+            </a:r>
+            <a:r>
+              <a:rPr lang="en-US" altLang="zh-CN" sz="6400" dirty="0">
+                <a:latin typeface="Arial" panose="020B0604020202020204" pitchFamily="34" charset="0"/>
+                <a:cs typeface="Arial" panose="020B0604020202020204" pitchFamily="34" charset="0"/>
+              </a:rPr>
+              <a:t>next</a:t>
+            </a:r>
+            <a:r>
+              <a:rPr lang="zh-CN" altLang="en-US" sz="6400" dirty="0">
+                <a:latin typeface="Arial" panose="020B0604020202020204" pitchFamily="34" charset="0"/>
+                <a:cs typeface="Arial" panose="020B0604020202020204" pitchFamily="34" charset="0"/>
+              </a:rPr>
+              <a:t> </a:t>
+            </a:r>
+            <a:r>
+              <a:rPr lang="en-US" altLang="zh-CN" sz="6400" dirty="0">
+                <a:latin typeface="Arial" panose="020B0604020202020204" pitchFamily="34" charset="0"/>
+                <a:cs typeface="Arial" panose="020B0604020202020204" pitchFamily="34" charset="0"/>
+              </a:rPr>
+              <a:t>trial.</a:t>
+            </a:r>
+            <a:endParaRPr lang="en-US" sz="4000" dirty="0">
+              <a:latin typeface="Arial" panose="020B0604020202020204" pitchFamily="34" charset="0"/>
+              <a:cs typeface="Arial" panose="020B0604020202020204" pitchFamily="34" charset="0"/>
+            </a:endParaRPr>
+          </a:p>
+        </p:txBody>
+      </p:sp>
+      <p:sp>
+        <p:nvSpPr>
+          <p:cNvPr id="10" name="Subtitle 2">
+            <a:extLst>
+              <a:ext uri="{FF2B5EF4-FFF2-40B4-BE49-F238E27FC236}">
+                <a16:creationId xmlns:a16="http://schemas.microsoft.com/office/drawing/2014/main" id="{7B657E54-FB0B-9846-9D3A-5F4CAB62197F}"/>
+              </a:ext>
+            </a:extLst>
+          </p:cNvPr>
+          <p:cNvSpPr txBox="1">
+            <a:spLocks/>
+          </p:cNvSpPr>
+          <p:nvPr/>
+        </p:nvSpPr>
+        <p:spPr>
+          <a:xfrm>
+            <a:off x="6379134" y="10910125"/>
+            <a:ext cx="10163955" cy="2539913"/>
           </a:xfrm>
           <a:prstGeom prst="rect">
             <a:avLst/>
           </a:prstGeom>
         </p:spPr>
         <p:txBody>
-          <a:bodyPr wrap="square">
-            <a:spAutoFit/>
+          <a:bodyPr vert="horz" lIns="182856" tIns="91428" rIns="182856" bIns="91428" rtlCol="0">
+            <a:normAutofit/>
           </a:bodyPr>
-          <a:lstStyle/>
-          <a:p>
-            <a:r>
-              <a:rPr lang="en-US" sz="8000" dirty="0">
-                <a:latin typeface="Arial" panose="020B0604020202020204" pitchFamily="34" charset="0"/>
-                <a:cs typeface="Arial" panose="020B0604020202020204" pitchFamily="34" charset="0"/>
-              </a:rPr>
-              <a:t>At the next stage, you will conduct a short practice run to make sure that the task is clear. </a:t>
-            </a:r>
-          </a:p>
-          <a:p>
-            <a:endParaRPr lang="en-US" sz="8000" dirty="0">
+          <a:lstStyle>
+            <a:lvl1pPr marL="0" indent="0" algn="l" defTabSz="914400" rtl="0" eaLnBrk="1" latinLnBrk="0" hangingPunct="1">
+              <a:lnSpc>
+                <a:spcPct val="90000"/>
+              </a:lnSpc>
+              <a:spcBef>
+                <a:spcPts val="1200"/>
+              </a:spcBef>
+              <a:buClr>
+                <a:schemeClr val="accent1">
+                  <a:lumMod val="75000"/>
+                </a:schemeClr>
+              </a:buClr>
+              <a:buSzPct val="85000"/>
+              <a:buFont typeface="Wingdings" pitchFamily="2" charset="2"/>
+              <a:buNone/>
+              <a:defRPr sz="2200" kern="1200">
+                <a:solidFill>
+                  <a:schemeClr val="tx1"/>
+                </a:solidFill>
+                <a:latin typeface="+mn-lt"/>
+                <a:ea typeface="+mn-ea"/>
+                <a:cs typeface="+mn-cs"/>
+              </a:defRPr>
+            </a:lvl1pPr>
+            <a:lvl2pPr marL="457200" indent="0" algn="ctr" defTabSz="914400" rtl="0" eaLnBrk="1" latinLnBrk="0" hangingPunct="1">
+              <a:lnSpc>
+                <a:spcPct val="90000"/>
+              </a:lnSpc>
+              <a:spcBef>
+                <a:spcPts val="400"/>
+              </a:spcBef>
+              <a:spcAft>
+                <a:spcPts val="200"/>
+              </a:spcAft>
+              <a:buClr>
+                <a:schemeClr val="accent1">
+                  <a:lumMod val="75000"/>
+                </a:schemeClr>
+              </a:buClr>
+              <a:buSzPct val="85000"/>
+              <a:buFont typeface="Wingdings" pitchFamily="2" charset="2"/>
+              <a:buNone/>
+              <a:defRPr sz="2800" kern="1200">
+                <a:solidFill>
+                  <a:schemeClr val="tx1"/>
+                </a:solidFill>
+                <a:latin typeface="+mn-lt"/>
+                <a:ea typeface="+mn-ea"/>
+                <a:cs typeface="+mn-cs"/>
+              </a:defRPr>
+            </a:lvl2pPr>
+            <a:lvl3pPr marL="914400" indent="0" algn="ctr" defTabSz="914400" rtl="0" eaLnBrk="1" latinLnBrk="0" hangingPunct="1">
+              <a:lnSpc>
+                <a:spcPct val="90000"/>
+              </a:lnSpc>
+              <a:spcBef>
+                <a:spcPts val="400"/>
+              </a:spcBef>
+              <a:spcAft>
+                <a:spcPts val="200"/>
+              </a:spcAft>
+              <a:buClr>
+                <a:schemeClr val="accent1">
+                  <a:lumMod val="75000"/>
+                </a:schemeClr>
+              </a:buClr>
+              <a:buSzPct val="85000"/>
+              <a:buFont typeface="Wingdings" pitchFamily="2" charset="2"/>
+              <a:buNone/>
+              <a:defRPr sz="2400" kern="1200">
+                <a:solidFill>
+                  <a:schemeClr val="tx1"/>
+                </a:solidFill>
+                <a:latin typeface="+mn-lt"/>
+                <a:ea typeface="+mn-ea"/>
+                <a:cs typeface="+mn-cs"/>
+              </a:defRPr>
+            </a:lvl3pPr>
+            <a:lvl4pPr marL="1371600" indent="0" algn="ctr" defTabSz="914400" rtl="0" eaLnBrk="1" latinLnBrk="0" hangingPunct="1">
+              <a:lnSpc>
+                <a:spcPct val="90000"/>
+              </a:lnSpc>
+              <a:spcBef>
+                <a:spcPts val="400"/>
+              </a:spcBef>
+              <a:spcAft>
+                <a:spcPts val="200"/>
+              </a:spcAft>
+              <a:buClr>
+                <a:schemeClr val="accent1">
+                  <a:lumMod val="75000"/>
+                </a:schemeClr>
+              </a:buClr>
+              <a:buSzPct val="85000"/>
+              <a:buFont typeface="Wingdings" pitchFamily="2" charset="2"/>
+              <a:buNone/>
+              <a:defRPr sz="2000" kern="1200">
+                <a:solidFill>
+                  <a:schemeClr val="tx1"/>
+                </a:solidFill>
+                <a:latin typeface="+mn-lt"/>
+                <a:ea typeface="+mn-ea"/>
+                <a:cs typeface="+mn-cs"/>
+              </a:defRPr>
+            </a:lvl4pPr>
+            <a:lvl5pPr marL="1828800" indent="0" algn="ctr" defTabSz="914400" rtl="0" eaLnBrk="1" latinLnBrk="0" hangingPunct="1">
+              <a:lnSpc>
+                <a:spcPct val="90000"/>
+              </a:lnSpc>
+              <a:spcBef>
+                <a:spcPts val="400"/>
+              </a:spcBef>
+              <a:spcAft>
+                <a:spcPts val="200"/>
+              </a:spcAft>
+              <a:buClr>
+                <a:schemeClr val="accent1">
+                  <a:lumMod val="75000"/>
+                </a:schemeClr>
+              </a:buClr>
+              <a:buSzPct val="85000"/>
+              <a:buFont typeface="Wingdings" pitchFamily="2" charset="2"/>
+              <a:buNone/>
+              <a:defRPr sz="2000" kern="1200">
+                <a:solidFill>
+                  <a:schemeClr val="tx1"/>
+                </a:solidFill>
+                <a:latin typeface="+mn-lt"/>
+                <a:ea typeface="+mn-ea"/>
+                <a:cs typeface="+mn-cs"/>
+              </a:defRPr>
+            </a:lvl5pPr>
+            <a:lvl6pPr marL="2286000" indent="0" algn="ctr" defTabSz="914400" rtl="0" eaLnBrk="1" latinLnBrk="0" hangingPunct="1">
+              <a:lnSpc>
+                <a:spcPct val="90000"/>
+              </a:lnSpc>
+              <a:spcBef>
+                <a:spcPts val="400"/>
+              </a:spcBef>
+              <a:spcAft>
+                <a:spcPts val="200"/>
+              </a:spcAft>
+              <a:buClr>
+                <a:schemeClr val="accent1">
+                  <a:lumMod val="75000"/>
+                </a:schemeClr>
+              </a:buClr>
+              <a:buSzPct val="85000"/>
+              <a:buFont typeface="Wingdings" pitchFamily="2" charset="2"/>
+              <a:buNone/>
+              <a:defRPr sz="2000" kern="1200">
+                <a:solidFill>
+                  <a:schemeClr val="tx1"/>
+                </a:solidFill>
+                <a:latin typeface="+mn-lt"/>
+                <a:ea typeface="+mn-ea"/>
+                <a:cs typeface="+mn-cs"/>
+              </a:defRPr>
+            </a:lvl6pPr>
+            <a:lvl7pPr marL="2743200" indent="0" algn="ctr" defTabSz="914400" rtl="0" eaLnBrk="1" latinLnBrk="0" hangingPunct="1">
+              <a:lnSpc>
+                <a:spcPct val="90000"/>
+              </a:lnSpc>
+              <a:spcBef>
+                <a:spcPts val="400"/>
+              </a:spcBef>
+              <a:spcAft>
+                <a:spcPts val="200"/>
+              </a:spcAft>
+              <a:buClr>
+                <a:schemeClr val="accent1">
+                  <a:lumMod val="75000"/>
+                </a:schemeClr>
+              </a:buClr>
+              <a:buSzPct val="85000"/>
+              <a:buFont typeface="Wingdings" pitchFamily="2" charset="2"/>
+              <a:buNone/>
+              <a:defRPr sz="2000" kern="1200">
+                <a:solidFill>
+                  <a:schemeClr val="tx1"/>
+                </a:solidFill>
+                <a:latin typeface="+mn-lt"/>
+                <a:ea typeface="+mn-ea"/>
+                <a:cs typeface="+mn-cs"/>
+              </a:defRPr>
+            </a:lvl7pPr>
+            <a:lvl8pPr marL="3200400" indent="0" algn="ctr" defTabSz="914400" rtl="0" eaLnBrk="1" latinLnBrk="0" hangingPunct="1">
+              <a:lnSpc>
+                <a:spcPct val="90000"/>
+              </a:lnSpc>
+              <a:spcBef>
+                <a:spcPts val="400"/>
+              </a:spcBef>
+              <a:spcAft>
+                <a:spcPts val="200"/>
+              </a:spcAft>
+              <a:buClr>
+                <a:schemeClr val="accent1">
+                  <a:lumMod val="75000"/>
+                </a:schemeClr>
+              </a:buClr>
+              <a:buSzPct val="85000"/>
+              <a:buFont typeface="Wingdings" pitchFamily="2" charset="2"/>
+              <a:buNone/>
+              <a:defRPr sz="2000" kern="1200">
+                <a:solidFill>
+                  <a:schemeClr val="tx1"/>
+                </a:solidFill>
+                <a:latin typeface="+mn-lt"/>
+                <a:ea typeface="+mn-ea"/>
+                <a:cs typeface="+mn-cs"/>
+              </a:defRPr>
+            </a:lvl8pPr>
+            <a:lvl9pPr marL="3657600" indent="0" algn="ctr" defTabSz="914400" rtl="0" eaLnBrk="1" latinLnBrk="0" hangingPunct="1">
+              <a:lnSpc>
+                <a:spcPct val="90000"/>
+              </a:lnSpc>
+              <a:spcBef>
+                <a:spcPts val="400"/>
+              </a:spcBef>
+              <a:spcAft>
+                <a:spcPts val="200"/>
+              </a:spcAft>
+              <a:buClr>
+                <a:schemeClr val="accent1">
+                  <a:lumMod val="75000"/>
+                </a:schemeClr>
+              </a:buClr>
+              <a:buSzPct val="85000"/>
+              <a:buFont typeface="Wingdings" pitchFamily="2" charset="2"/>
+              <a:buNone/>
+              <a:defRPr sz="2000" kern="1200">
+                <a:solidFill>
+                  <a:schemeClr val="tx1"/>
+                </a:solidFill>
+                <a:latin typeface="+mn-lt"/>
+                <a:ea typeface="+mn-ea"/>
+                <a:cs typeface="+mn-cs"/>
+              </a:defRPr>
+            </a:lvl9pPr>
+          </a:lstStyle>
+          <a:p>
+            <a:endParaRPr lang="en-US" sz="4000" dirty="0">
               <a:latin typeface="Arial" panose="020B0604020202020204" pitchFamily="34" charset="0"/>
-              <a:cs typeface="Arial" panose="020B0604020202020204" pitchFamily="34" charset="0"/>
-            </a:endParaRPr>
-          </a:p>
-          <a:p>
-            <a:r>
-              <a:rPr lang="en-US" sz="8000" dirty="0">
-                <a:latin typeface="Arial" panose="020B0604020202020204" pitchFamily="34" charset="0"/>
-                <a:cs typeface="Arial" panose="020B0604020202020204" pitchFamily="34" charset="0"/>
-              </a:rPr>
-              <a:t>Remember – the goal is to </a:t>
-            </a:r>
-            <a:r>
-              <a:rPr lang="en-US" sz="8000" dirty="0">
-                <a:latin typeface="Arial" panose="020B0604020202020204" pitchFamily="34" charset="0"/>
-              </a:rPr>
-              <a:t>ESTIMATE THE AVERAGE EMOTIONAL RESPONSES of the </a:t>
-            </a:r>
-            <a:r>
-              <a:rPr lang="en-US" sz="8000" dirty="0">
-                <a:solidFill>
-                  <a:srgbClr val="FF0000"/>
-                </a:solidFill>
-                <a:latin typeface="Arial" panose="020B0604020202020204" pitchFamily="34" charset="0"/>
-              </a:rPr>
-              <a:t>sequence</a:t>
-            </a:r>
-            <a:r>
-              <a:rPr lang="en-US" sz="8000" dirty="0">
-                <a:latin typeface="Arial" panose="020B0604020202020204" pitchFamily="34" charset="0"/>
-              </a:rPr>
-              <a:t> of faces you just saw.</a:t>
-            </a:r>
-            <a:r>
-              <a:rPr lang="en-US" altLang="zh-CN" sz="8000" b="1" dirty="0">
-                <a:latin typeface="Arial" panose="020B0604020202020204" pitchFamily="34" charset="0"/>
-                <a:cs typeface="Arial" panose="020B0604020202020204" pitchFamily="34" charset="0"/>
-              </a:rPr>
-              <a:t> </a:t>
-            </a:r>
-            <a:endParaRPr lang="en-US" sz="8000" dirty="0">
-              <a:latin typeface="Arial" panose="020B0604020202020204" pitchFamily="34" charset="0"/>
-              <a:cs typeface="Arial" panose="020B0604020202020204" pitchFamily="34" charset="0"/>
             </a:endParaRPr>
           </a:p>
         </p:txBody>
@@ -4596,7 +4849,7 @@
     </p:spTree>
     <p:extLst>
       <p:ext uri="{BB962C8B-B14F-4D97-AF65-F5344CB8AC3E}">
-        <p14:creationId xmlns:p14="http://schemas.microsoft.com/office/powerpoint/2010/main" val="3209940208"/>
+        <p14:creationId xmlns:p14="http://schemas.microsoft.com/office/powerpoint/2010/main" val="999307571"/>
       </p:ext>
     </p:extLst>
   </p:cSld>
@@ -4633,6 +4886,137 @@
       </p:grpSpPr>
       <p:sp>
         <p:nvSpPr>
+          <p:cNvPr id="4" name="Rectangle 3">
+            <a:extLst>
+              <a:ext uri="{FF2B5EF4-FFF2-40B4-BE49-F238E27FC236}">
+                <a16:creationId xmlns:a16="http://schemas.microsoft.com/office/drawing/2014/main" id="{8E3B8A65-8FC9-41F2-998D-6A0E4DAA3B8F}"/>
+              </a:ext>
+            </a:extLst>
+          </p:cNvPr>
+          <p:cNvSpPr/>
+          <p:nvPr/>
+        </p:nvSpPr>
+        <p:spPr>
+          <a:xfrm>
+            <a:off x="749150" y="2090049"/>
+            <a:ext cx="22880871" cy="7478766"/>
+          </a:xfrm>
+          <a:prstGeom prst="rect">
+            <a:avLst/>
+          </a:prstGeom>
+        </p:spPr>
+        <p:txBody>
+          <a:bodyPr wrap="square">
+            <a:spAutoFit/>
+          </a:bodyPr>
+          <a:lstStyle/>
+          <a:p>
+            <a:r>
+              <a:rPr lang="en-US" sz="8000" dirty="0">
+                <a:latin typeface="Arial" panose="020B0604020202020204" pitchFamily="34" charset="0"/>
+                <a:cs typeface="Arial" panose="020B0604020202020204" pitchFamily="34" charset="0"/>
+              </a:rPr>
+              <a:t>At the next stage, you will conduct a short practice run to make sure that the task is clear. </a:t>
+            </a:r>
+          </a:p>
+          <a:p>
+            <a:endParaRPr lang="en-US" sz="8000" dirty="0">
+              <a:latin typeface="Arial" panose="020B0604020202020204" pitchFamily="34" charset="0"/>
+              <a:cs typeface="Arial" panose="020B0604020202020204" pitchFamily="34" charset="0"/>
+            </a:endParaRPr>
+          </a:p>
+          <a:p>
+            <a:r>
+              <a:rPr lang="en-US" sz="8000" dirty="0">
+                <a:latin typeface="Arial" panose="020B0604020202020204" pitchFamily="34" charset="0"/>
+                <a:cs typeface="Arial" panose="020B0604020202020204" pitchFamily="34" charset="0"/>
+              </a:rPr>
+              <a:t>Remember – the goal is to </a:t>
+            </a:r>
+            <a:r>
+              <a:rPr lang="en-US" sz="8000" dirty="0">
+                <a:latin typeface="Arial" panose="020B0604020202020204" pitchFamily="34" charset="0"/>
+              </a:rPr>
+              <a:t>ESTIMATE </a:t>
+            </a:r>
+            <a:r>
+              <a:rPr lang="en-US" sz="8000" dirty="0" smtClean="0">
+                <a:latin typeface="Arial" panose="020B0604020202020204" pitchFamily="34" charset="0"/>
+              </a:rPr>
+              <a:t>THE AVERAGE</a:t>
+            </a:r>
+            <a:r>
+              <a:rPr lang="en-US" sz="8000" dirty="0">
+                <a:latin typeface="Arial" panose="020B0604020202020204" pitchFamily="34" charset="0"/>
+              </a:rPr>
+              <a:t> EMOTIONAL RESPONSE of the of the </a:t>
+            </a:r>
+            <a:r>
+              <a:rPr lang="en-US" sz="8000" dirty="0" smtClean="0">
+                <a:latin typeface="Arial" panose="020B0604020202020204" pitchFamily="34" charset="0"/>
+              </a:rPr>
+              <a:t>face sequence </a:t>
+            </a:r>
+            <a:r>
+              <a:rPr lang="en-US" sz="8000" dirty="0">
+                <a:latin typeface="Arial" panose="020B0604020202020204" pitchFamily="34" charset="0"/>
+              </a:rPr>
+              <a:t>you just saw.</a:t>
+            </a:r>
+            <a:r>
+              <a:rPr lang="en-US" altLang="zh-CN" sz="8000" b="1" dirty="0">
+                <a:latin typeface="Arial" panose="020B0604020202020204" pitchFamily="34" charset="0"/>
+                <a:cs typeface="Arial" panose="020B0604020202020204" pitchFamily="34" charset="0"/>
+              </a:rPr>
+              <a:t> </a:t>
+            </a:r>
+            <a:endParaRPr lang="en-US" sz="8000" dirty="0">
+              <a:latin typeface="Arial" panose="020B0604020202020204" pitchFamily="34" charset="0"/>
+              <a:cs typeface="Arial" panose="020B0604020202020204" pitchFamily="34" charset="0"/>
+            </a:endParaRPr>
+          </a:p>
+        </p:txBody>
+      </p:sp>
+    </p:spTree>
+    <p:extLst>
+      <p:ext uri="{BB962C8B-B14F-4D97-AF65-F5344CB8AC3E}">
+        <p14:creationId xmlns:p14="http://schemas.microsoft.com/office/powerpoint/2010/main" val="3209940208"/>
+      </p:ext>
+    </p:extLst>
+  </p:cSld>
+  <p:clrMapOvr>
+    <a:masterClrMapping/>
+  </p:clrMapOvr>
+</p:sld>
+</file>
+
+<file path=ppt/slides/slide8.xml><?xml version="1.0" encoding="utf-8"?>
+<p:sld xmlns:a="http://schemas.openxmlformats.org/drawingml/2006/main" xmlns:r="http://schemas.openxmlformats.org/officeDocument/2006/relationships" xmlns:p="http://schemas.openxmlformats.org/presentationml/2006/main">
+  <p:cSld>
+    <p:bg>
+      <p:bgPr>
+        <a:solidFill>
+          <a:srgbClr val="AAAAAA"/>
+        </a:solidFill>
+        <a:effectLst/>
+      </p:bgPr>
+    </p:bg>
+    <p:spTree>
+      <p:nvGrpSpPr>
+        <p:cNvPr id="1" name=""/>
+        <p:cNvGrpSpPr/>
+        <p:nvPr/>
+      </p:nvGrpSpPr>
+      <p:grpSpPr>
+        <a:xfrm>
+          <a:off x="0" y="0"/>
+          <a:ext cx="0" cy="0"/>
+          <a:chOff x="0" y="0"/>
+          <a:chExt cx="0" cy="0"/>
+        </a:xfrm>
+      </p:grpSpPr>
+      <p:sp>
+        <p:nvSpPr>
           <p:cNvPr id="7" name="Subtitle 2">
             <a:extLst>
               <a:ext uri="{FF2B5EF4-FFF2-40B4-BE49-F238E27FC236}">
@@ -4921,7 +5305,16 @@
               <a:rPr lang="en-US" sz="7200" dirty="0">
                 <a:latin typeface="Arial" panose="020B0604020202020204" pitchFamily="34" charset="0"/>
               </a:rPr>
-              <a:t>ESTIMATE THE AVERAGE EMOTIONAL RESPONSES of the </a:t>
+              <a:t>ESTIMATE THE </a:t>
+            </a:r>
+            <a:r>
+              <a:rPr lang="en-US" sz="7200" dirty="0" smtClean="0">
+                <a:solidFill>
+                  <a:srgbClr val="FF0000"/>
+                </a:solidFill>
+                <a:latin typeface="Arial" panose="020B0604020202020204" pitchFamily="34" charset="0"/>
+              </a:rPr>
+              <a:t>AVERAGE EMOTIONAL </a:t>
             </a:r>
             <a:r>
               <a:rPr lang="en-US" sz="7200" dirty="0">
@@ -4930,13 +5323,25 @@
                 </a:solidFill>
                 <a:latin typeface="Arial" panose="020B0604020202020204" pitchFamily="34" charset="0"/>
               </a:rPr>
-              <a:t>sequence</a:t>
+              <a:t>RESPONSE</a:t>
             </a:r>
             <a:r>
               <a:rPr lang="en-US" sz="7200" dirty="0">
                 <a:latin typeface="Arial" panose="020B0604020202020204" pitchFamily="34" charset="0"/>
               </a:rPr>
-              <a:t> of faces you just saw.</a:t>
+              <a:t> of the face </a:t>
+            </a:r>
+            <a:r>
+              <a:rPr lang="en-US" sz="7200" dirty="0" smtClean="0">
+                <a:latin typeface="Arial" panose="020B0604020202020204" pitchFamily="34" charset="0"/>
+              </a:rPr>
+              <a:t>sequence you </a:t>
+            </a:r>
+            <a:r>
+              <a:rPr lang="en-US" sz="7200" dirty="0">
+                <a:latin typeface="Arial" panose="020B0604020202020204" pitchFamily="34" charset="0"/>
+              </a:rPr>
+              <a:t>just saw.</a:t>
             </a:r>
             <a:r>
               <a:rPr lang="en-US" altLang="zh-CN" sz="7200" b="1" dirty="0">
@@ -4964,23 +5369,7 @@
                 <a:ea typeface="+mj-ea"/>
                 <a:cs typeface="+mj-cs"/>
               </a:rPr>
-              <a:t>In the following section you will complete the actual study, which consists of 50 trials. The task should </a:t>
-            </a:r>
-            <a:r>
-              <a:rPr lang="en-US" sz="7200">
-                <a:latin typeface="Arial" panose="020B0604020202020204" pitchFamily="34" charset="0"/>
-                <a:ea typeface="+mj-ea"/>
-                <a:cs typeface="+mj-cs"/>
-              </a:rPr>
-              <a:t>take 25 </a:t>
-            </a:r>
-            <a:r>
-              <a:rPr lang="en-US" sz="7200" dirty="0">
-                <a:latin typeface="Arial" panose="020B0604020202020204" pitchFamily="34" charset="0"/>
-                <a:ea typeface="+mj-ea"/>
-                <a:cs typeface="+mj-cs"/>
-              </a:rPr>
-              <a:t>minutes, more or less. </a:t>
+              <a:t>In the following section you will complete the actual study, which consists of 50 trials. The task should take 5 minutes, more or less. </a:t>
             </a:r>
           </a:p>
           <a:p>
@@ -5075,7 +5464,7 @@
 </p:sld>
 </file>
 
-<file path=ppt/slides/slide8.xml><?xml version="1.0" encoding="utf-8"?>
+<file path=ppt/slides/slide9.xml><?xml version="1.0" encoding="utf-8"?>
 <p:sld xmlns:a="http://schemas.openxmlformats.org/drawingml/2006/main" xmlns:r="http://schemas.openxmlformats.org/officeDocument/2006/relationships" xmlns:p="http://schemas.openxmlformats.org/presentationml/2006/main">
   <p:cSld>
     <p:bg>

</xml_diff>